<commit_message>
[lab1] add description in file
</commit_message>
<xml_diff>
--- a/LABs/lab1/Lab 1 Introduction.pptx
+++ b/LABs/lab1/Lab 1 Introduction.pptx
@@ -5,25 +5,30 @@
     <p:sldMasterId id="2147483648" r:id="rId1"/>
   </p:sldMasterIdLst>
   <p:notesMasterIdLst>
-    <p:notesMasterId r:id="rId18"/>
+    <p:notesMasterId r:id="rId23"/>
   </p:notesMasterIdLst>
   <p:sldIdLst>
     <p:sldId id="256" r:id="rId2"/>
     <p:sldId id="261" r:id="rId3"/>
     <p:sldId id="258" r:id="rId4"/>
-    <p:sldId id="266" r:id="rId5"/>
-    <p:sldId id="263" r:id="rId6"/>
-    <p:sldId id="264" r:id="rId7"/>
-    <p:sldId id="283" r:id="rId8"/>
-    <p:sldId id="265" r:id="rId9"/>
-    <p:sldId id="267" r:id="rId10"/>
-    <p:sldId id="257" r:id="rId11"/>
-    <p:sldId id="281" r:id="rId12"/>
-    <p:sldId id="268" r:id="rId13"/>
-    <p:sldId id="269" r:id="rId14"/>
-    <p:sldId id="282" r:id="rId15"/>
-    <p:sldId id="276" r:id="rId16"/>
-    <p:sldId id="279" r:id="rId17"/>
+    <p:sldId id="284" r:id="rId5"/>
+    <p:sldId id="266" r:id="rId6"/>
+    <p:sldId id="263" r:id="rId7"/>
+    <p:sldId id="264" r:id="rId8"/>
+    <p:sldId id="289" r:id="rId9"/>
+    <p:sldId id="291" r:id="rId10"/>
+    <p:sldId id="292" r:id="rId11"/>
+    <p:sldId id="293" r:id="rId12"/>
+    <p:sldId id="265" r:id="rId13"/>
+    <p:sldId id="267" r:id="rId14"/>
+    <p:sldId id="257" r:id="rId15"/>
+    <p:sldId id="281" r:id="rId16"/>
+    <p:sldId id="268" r:id="rId17"/>
+    <p:sldId id="269" r:id="rId18"/>
+    <p:sldId id="282" r:id="rId19"/>
+    <p:sldId id="276" r:id="rId20"/>
+    <p:sldId id="279" r:id="rId21"/>
+    <p:sldId id="288" r:id="rId22"/>
   </p:sldIdLst>
   <p:sldSz cx="12192000" cy="6858000"/>
   <p:notesSz cx="6858000" cy="9144000"/>
@@ -3070,7 +3075,7 @@
           <a:p>
             <a:fld id="{4C2F714D-7E63-48DE-ABA9-505FA9EBE722}" type="datetimeFigureOut">
               <a:rPr lang="zh-TW" altLang="en-US" smtClean="0"/>
-              <a:t>2021/2/23</a:t>
+              <a:t>2021/3/15</a:t>
             </a:fld>
             <a:endParaRPr lang="zh-TW" altLang="en-US"/>
           </a:p>
@@ -3410,7 +3415,7 @@
           <a:p>
             <a:fld id="{D50A1602-7D1B-3541-AD72-6426A7AD9600}" type="slidenum">
               <a:rPr lang="en-US" smtClean="0"/>
-              <a:t>6</a:t>
+              <a:t>7</a:t>
             </a:fld>
             <a:endParaRPr lang="en-US"/>
           </a:p>
@@ -3420,6 +3425,374 @@
     <p:extLst>
       <p:ext uri="{BB962C8B-B14F-4D97-AF65-F5344CB8AC3E}">
         <p14:creationId xmlns:p14="http://schemas.microsoft.com/office/powerpoint/2010/main" val="3289899945"/>
+      </p:ext>
+    </p:extLst>
+  </p:cSld>
+  <p:clrMapOvr>
+    <a:masterClrMapping/>
+  </p:clrMapOvr>
+</p:notes>
+</file>
+
+<file path=ppt/notesSlides/notesSlide2.xml><?xml version="1.0" encoding="utf-8"?>
+<p:notes xmlns:a="http://schemas.openxmlformats.org/drawingml/2006/main" xmlns:r="http://schemas.openxmlformats.org/officeDocument/2006/relationships" xmlns:p="http://schemas.openxmlformats.org/presentationml/2006/main">
+  <p:cSld>
+    <p:spTree>
+      <p:nvGrpSpPr>
+        <p:cNvPr id="1" name=""/>
+        <p:cNvGrpSpPr/>
+        <p:nvPr/>
+      </p:nvGrpSpPr>
+      <p:grpSpPr>
+        <a:xfrm>
+          <a:off x="0" y="0"/>
+          <a:ext cx="0" cy="0"/>
+          <a:chOff x="0" y="0"/>
+          <a:chExt cx="0" cy="0"/>
+        </a:xfrm>
+      </p:grpSpPr>
+      <p:sp>
+        <p:nvSpPr>
+          <p:cNvPr id="2" name="Slide Image Placeholder 1"/>
+          <p:cNvSpPr>
+            <a:spLocks noGrp="1" noRot="1" noChangeAspect="1"/>
+          </p:cNvSpPr>
+          <p:nvPr>
+            <p:ph type="sldImg"/>
+          </p:nvPr>
+        </p:nvSpPr>
+        <p:spPr/>
+      </p:sp>
+      <p:sp>
+        <p:nvSpPr>
+          <p:cNvPr id="3" name="Notes Placeholder 2"/>
+          <p:cNvSpPr>
+            <a:spLocks noGrp="1"/>
+          </p:cNvSpPr>
+          <p:nvPr>
+            <p:ph type="body" idx="1"/>
+          </p:nvPr>
+        </p:nvSpPr>
+        <p:spPr/>
+        <p:txBody>
+          <a:bodyPr/>
+          <a:lstStyle/>
+          <a:p>
+            <a:r>
+              <a:rPr lang="en-US" dirty="0"/>
+              <a:t>man</a:t>
+            </a:r>
+            <a:r>
+              <a:rPr lang="en-US" baseline="0" dirty="0"/>
+              <a:t> socket</a:t>
+            </a:r>
+            <a:endParaRPr lang="en-US" dirty="0"/>
+          </a:p>
+        </p:txBody>
+      </p:sp>
+      <p:sp>
+        <p:nvSpPr>
+          <p:cNvPr id="4" name="Slide Number Placeholder 3"/>
+          <p:cNvSpPr>
+            <a:spLocks noGrp="1"/>
+          </p:cNvSpPr>
+          <p:nvPr>
+            <p:ph type="sldNum" sz="quarter" idx="10"/>
+          </p:nvPr>
+        </p:nvSpPr>
+        <p:spPr/>
+        <p:txBody>
+          <a:bodyPr/>
+          <a:lstStyle/>
+          <a:p>
+            <a:fld id="{D50A1602-7D1B-3541-AD72-6426A7AD9600}" type="slidenum">
+              <a:rPr lang="en-US" smtClean="0"/>
+              <a:t>8</a:t>
+            </a:fld>
+            <a:endParaRPr lang="en-US"/>
+          </a:p>
+        </p:txBody>
+      </p:sp>
+    </p:spTree>
+    <p:extLst>
+      <p:ext uri="{BB962C8B-B14F-4D97-AF65-F5344CB8AC3E}">
+        <p14:creationId xmlns:p14="http://schemas.microsoft.com/office/powerpoint/2010/main" val="4216453181"/>
+      </p:ext>
+    </p:extLst>
+  </p:cSld>
+  <p:clrMapOvr>
+    <a:masterClrMapping/>
+  </p:clrMapOvr>
+</p:notes>
+</file>
+
+<file path=ppt/notesSlides/notesSlide3.xml><?xml version="1.0" encoding="utf-8"?>
+<p:notes xmlns:a="http://schemas.openxmlformats.org/drawingml/2006/main" xmlns:r="http://schemas.openxmlformats.org/officeDocument/2006/relationships" xmlns:p="http://schemas.openxmlformats.org/presentationml/2006/main">
+  <p:cSld>
+    <p:spTree>
+      <p:nvGrpSpPr>
+        <p:cNvPr id="1" name=""/>
+        <p:cNvGrpSpPr/>
+        <p:nvPr/>
+      </p:nvGrpSpPr>
+      <p:grpSpPr>
+        <a:xfrm>
+          <a:off x="0" y="0"/>
+          <a:ext cx="0" cy="0"/>
+          <a:chOff x="0" y="0"/>
+          <a:chExt cx="0" cy="0"/>
+        </a:xfrm>
+      </p:grpSpPr>
+      <p:sp>
+        <p:nvSpPr>
+          <p:cNvPr id="2" name="Slide Image Placeholder 1"/>
+          <p:cNvSpPr>
+            <a:spLocks noGrp="1" noRot="1" noChangeAspect="1"/>
+          </p:cNvSpPr>
+          <p:nvPr>
+            <p:ph type="sldImg"/>
+          </p:nvPr>
+        </p:nvSpPr>
+        <p:spPr/>
+      </p:sp>
+      <p:sp>
+        <p:nvSpPr>
+          <p:cNvPr id="3" name="Notes Placeholder 2"/>
+          <p:cNvSpPr>
+            <a:spLocks noGrp="1"/>
+          </p:cNvSpPr>
+          <p:nvPr>
+            <p:ph type="body" idx="1"/>
+          </p:nvPr>
+        </p:nvSpPr>
+        <p:spPr/>
+        <p:txBody>
+          <a:bodyPr/>
+          <a:lstStyle/>
+          <a:p>
+            <a:r>
+              <a:rPr lang="en-US" dirty="0"/>
+              <a:t>man</a:t>
+            </a:r>
+            <a:r>
+              <a:rPr lang="en-US" baseline="0" dirty="0"/>
+              <a:t> socket</a:t>
+            </a:r>
+            <a:endParaRPr lang="en-US" dirty="0"/>
+          </a:p>
+        </p:txBody>
+      </p:sp>
+      <p:sp>
+        <p:nvSpPr>
+          <p:cNvPr id="4" name="Slide Number Placeholder 3"/>
+          <p:cNvSpPr>
+            <a:spLocks noGrp="1"/>
+          </p:cNvSpPr>
+          <p:nvPr>
+            <p:ph type="sldNum" sz="quarter" idx="10"/>
+          </p:nvPr>
+        </p:nvSpPr>
+        <p:spPr/>
+        <p:txBody>
+          <a:bodyPr/>
+          <a:lstStyle/>
+          <a:p>
+            <a:fld id="{D50A1602-7D1B-3541-AD72-6426A7AD9600}" type="slidenum">
+              <a:rPr lang="en-US" smtClean="0"/>
+              <a:t>9</a:t>
+            </a:fld>
+            <a:endParaRPr lang="en-US"/>
+          </a:p>
+        </p:txBody>
+      </p:sp>
+    </p:spTree>
+    <p:extLst>
+      <p:ext uri="{BB962C8B-B14F-4D97-AF65-F5344CB8AC3E}">
+        <p14:creationId xmlns:p14="http://schemas.microsoft.com/office/powerpoint/2010/main" val="3714728420"/>
+      </p:ext>
+    </p:extLst>
+  </p:cSld>
+  <p:clrMapOvr>
+    <a:masterClrMapping/>
+  </p:clrMapOvr>
+</p:notes>
+</file>
+
+<file path=ppt/notesSlides/notesSlide4.xml><?xml version="1.0" encoding="utf-8"?>
+<p:notes xmlns:a="http://schemas.openxmlformats.org/drawingml/2006/main" xmlns:r="http://schemas.openxmlformats.org/officeDocument/2006/relationships" xmlns:p="http://schemas.openxmlformats.org/presentationml/2006/main">
+  <p:cSld>
+    <p:spTree>
+      <p:nvGrpSpPr>
+        <p:cNvPr id="1" name=""/>
+        <p:cNvGrpSpPr/>
+        <p:nvPr/>
+      </p:nvGrpSpPr>
+      <p:grpSpPr>
+        <a:xfrm>
+          <a:off x="0" y="0"/>
+          <a:ext cx="0" cy="0"/>
+          <a:chOff x="0" y="0"/>
+          <a:chExt cx="0" cy="0"/>
+        </a:xfrm>
+      </p:grpSpPr>
+      <p:sp>
+        <p:nvSpPr>
+          <p:cNvPr id="2" name="Slide Image Placeholder 1"/>
+          <p:cNvSpPr>
+            <a:spLocks noGrp="1" noRot="1" noChangeAspect="1"/>
+          </p:cNvSpPr>
+          <p:nvPr>
+            <p:ph type="sldImg"/>
+          </p:nvPr>
+        </p:nvSpPr>
+        <p:spPr/>
+      </p:sp>
+      <p:sp>
+        <p:nvSpPr>
+          <p:cNvPr id="3" name="Notes Placeholder 2"/>
+          <p:cNvSpPr>
+            <a:spLocks noGrp="1"/>
+          </p:cNvSpPr>
+          <p:nvPr>
+            <p:ph type="body" idx="1"/>
+          </p:nvPr>
+        </p:nvSpPr>
+        <p:spPr/>
+        <p:txBody>
+          <a:bodyPr/>
+          <a:lstStyle/>
+          <a:p>
+            <a:r>
+              <a:rPr lang="en-US" dirty="0"/>
+              <a:t>man</a:t>
+            </a:r>
+            <a:r>
+              <a:rPr lang="en-US" baseline="0" dirty="0"/>
+              <a:t> socket</a:t>
+            </a:r>
+            <a:endParaRPr lang="en-US" dirty="0"/>
+          </a:p>
+        </p:txBody>
+      </p:sp>
+      <p:sp>
+        <p:nvSpPr>
+          <p:cNvPr id="4" name="Slide Number Placeholder 3"/>
+          <p:cNvSpPr>
+            <a:spLocks noGrp="1"/>
+          </p:cNvSpPr>
+          <p:nvPr>
+            <p:ph type="sldNum" sz="quarter" idx="10"/>
+          </p:nvPr>
+        </p:nvSpPr>
+        <p:spPr/>
+        <p:txBody>
+          <a:bodyPr/>
+          <a:lstStyle/>
+          <a:p>
+            <a:fld id="{D50A1602-7D1B-3541-AD72-6426A7AD9600}" type="slidenum">
+              <a:rPr lang="en-US" smtClean="0"/>
+              <a:t>10</a:t>
+            </a:fld>
+            <a:endParaRPr lang="en-US"/>
+          </a:p>
+        </p:txBody>
+      </p:sp>
+    </p:spTree>
+    <p:extLst>
+      <p:ext uri="{BB962C8B-B14F-4D97-AF65-F5344CB8AC3E}">
+        <p14:creationId xmlns:p14="http://schemas.microsoft.com/office/powerpoint/2010/main" val="145160208"/>
+      </p:ext>
+    </p:extLst>
+  </p:cSld>
+  <p:clrMapOvr>
+    <a:masterClrMapping/>
+  </p:clrMapOvr>
+</p:notes>
+</file>
+
+<file path=ppt/notesSlides/notesSlide5.xml><?xml version="1.0" encoding="utf-8"?>
+<p:notes xmlns:a="http://schemas.openxmlformats.org/drawingml/2006/main" xmlns:r="http://schemas.openxmlformats.org/officeDocument/2006/relationships" xmlns:p="http://schemas.openxmlformats.org/presentationml/2006/main">
+  <p:cSld>
+    <p:spTree>
+      <p:nvGrpSpPr>
+        <p:cNvPr id="1" name=""/>
+        <p:cNvGrpSpPr/>
+        <p:nvPr/>
+      </p:nvGrpSpPr>
+      <p:grpSpPr>
+        <a:xfrm>
+          <a:off x="0" y="0"/>
+          <a:ext cx="0" cy="0"/>
+          <a:chOff x="0" y="0"/>
+          <a:chExt cx="0" cy="0"/>
+        </a:xfrm>
+      </p:grpSpPr>
+      <p:sp>
+        <p:nvSpPr>
+          <p:cNvPr id="2" name="Slide Image Placeholder 1"/>
+          <p:cNvSpPr>
+            <a:spLocks noGrp="1" noRot="1" noChangeAspect="1"/>
+          </p:cNvSpPr>
+          <p:nvPr>
+            <p:ph type="sldImg"/>
+          </p:nvPr>
+        </p:nvSpPr>
+        <p:spPr/>
+      </p:sp>
+      <p:sp>
+        <p:nvSpPr>
+          <p:cNvPr id="3" name="Notes Placeholder 2"/>
+          <p:cNvSpPr>
+            <a:spLocks noGrp="1"/>
+          </p:cNvSpPr>
+          <p:nvPr>
+            <p:ph type="body" idx="1"/>
+          </p:nvPr>
+        </p:nvSpPr>
+        <p:spPr/>
+        <p:txBody>
+          <a:bodyPr/>
+          <a:lstStyle/>
+          <a:p>
+            <a:r>
+              <a:rPr lang="en-US" dirty="0"/>
+              <a:t>man</a:t>
+            </a:r>
+            <a:r>
+              <a:rPr lang="en-US" baseline="0" dirty="0"/>
+              <a:t> socket</a:t>
+            </a:r>
+            <a:endParaRPr lang="en-US" dirty="0"/>
+          </a:p>
+        </p:txBody>
+      </p:sp>
+      <p:sp>
+        <p:nvSpPr>
+          <p:cNvPr id="4" name="Slide Number Placeholder 3"/>
+          <p:cNvSpPr>
+            <a:spLocks noGrp="1"/>
+          </p:cNvSpPr>
+          <p:nvPr>
+            <p:ph type="sldNum" sz="quarter" idx="10"/>
+          </p:nvPr>
+        </p:nvSpPr>
+        <p:spPr/>
+        <p:txBody>
+          <a:bodyPr/>
+          <a:lstStyle/>
+          <a:p>
+            <a:fld id="{D50A1602-7D1B-3541-AD72-6426A7AD9600}" type="slidenum">
+              <a:rPr lang="en-US" smtClean="0"/>
+              <a:t>11</a:t>
+            </a:fld>
+            <a:endParaRPr lang="en-US"/>
+          </a:p>
+        </p:txBody>
+      </p:sp>
+    </p:spTree>
+    <p:extLst>
+      <p:ext uri="{BB962C8B-B14F-4D97-AF65-F5344CB8AC3E}">
+        <p14:creationId xmlns:p14="http://schemas.microsoft.com/office/powerpoint/2010/main" val="4218468294"/>
       </p:ext>
     </p:extLst>
   </p:cSld>
@@ -3558,7 +3931,7 @@
           <a:p>
             <a:fld id="{66014C6B-E448-42EA-9D63-082D12F30F62}" type="datetimeFigureOut">
               <a:rPr lang="zh-TW" altLang="en-US" smtClean="0"/>
-              <a:t>2021/2/23</a:t>
+              <a:t>2021/3/15</a:t>
             </a:fld>
             <a:endParaRPr lang="zh-TW" altLang="en-US"/>
           </a:p>
@@ -3726,7 +4099,7 @@
           <a:p>
             <a:fld id="{66014C6B-E448-42EA-9D63-082D12F30F62}" type="datetimeFigureOut">
               <a:rPr lang="zh-TW" altLang="en-US" smtClean="0"/>
-              <a:t>2021/2/23</a:t>
+              <a:t>2021/3/15</a:t>
             </a:fld>
             <a:endParaRPr lang="zh-TW" altLang="en-US"/>
           </a:p>
@@ -3904,7 +4277,7 @@
           <a:p>
             <a:fld id="{66014C6B-E448-42EA-9D63-082D12F30F62}" type="datetimeFigureOut">
               <a:rPr lang="zh-TW" altLang="en-US" smtClean="0"/>
-              <a:t>2021/2/23</a:t>
+              <a:t>2021/3/15</a:t>
             </a:fld>
             <a:endParaRPr lang="zh-TW" altLang="en-US"/>
           </a:p>
@@ -4017,39 +4390,53 @@
         <p:spPr/>
         <p:txBody>
           <a:bodyPr/>
-          <a:lstStyle/>
+          <a:lstStyle>
+            <a:lvl1pPr>
+              <a:defRPr sz="2400"/>
+            </a:lvl1pPr>
+            <a:lvl2pPr marL="685800" indent="-228600">
+              <a:buFont typeface="Wingdings" panose="05000000000000000000" pitchFamily="2" charset="2"/>
+              <a:buChar char="Ø"/>
+              <a:defRPr sz="2200"/>
+            </a:lvl2pPr>
+            <a:lvl3pPr marL="1257300" indent="-342900">
+              <a:buFont typeface="Arial" panose="020B0604020202020204" pitchFamily="34" charset="0"/>
+              <a:buChar char="•"/>
+              <a:defRPr/>
+            </a:lvl3pPr>
+          </a:lstStyle>
           <a:p>
             <a:pPr lvl="0"/>
             <a:r>
-              <a:rPr lang="zh-TW" altLang="en-US"/>
+              <a:rPr lang="zh-TW" altLang="en-US" dirty="0"/>
               <a:t>編輯母片文字樣式</a:t>
             </a:r>
           </a:p>
           <a:p>
             <a:pPr lvl="1"/>
             <a:r>
-              <a:rPr lang="zh-TW" altLang="en-US"/>
+              <a:rPr lang="zh-TW" altLang="en-US" dirty="0"/>
               <a:t>第二層</a:t>
             </a:r>
           </a:p>
           <a:p>
             <a:pPr lvl="2"/>
             <a:r>
-              <a:rPr lang="zh-TW" altLang="en-US"/>
+              <a:rPr lang="zh-TW" altLang="en-US" dirty="0"/>
               <a:t>第三層</a:t>
             </a:r>
           </a:p>
           <a:p>
             <a:pPr lvl="3"/>
             <a:r>
-              <a:rPr lang="zh-TW" altLang="en-US"/>
+              <a:rPr lang="zh-TW" altLang="en-US" dirty="0"/>
               <a:t>第四層</a:t>
             </a:r>
           </a:p>
           <a:p>
             <a:pPr lvl="4"/>
             <a:r>
-              <a:rPr lang="zh-TW" altLang="en-US"/>
+              <a:rPr lang="zh-TW" altLang="en-US" dirty="0"/>
               <a:t>第五層</a:t>
             </a:r>
           </a:p>
@@ -4072,7 +4459,7 @@
           <a:p>
             <a:fld id="{66014C6B-E448-42EA-9D63-082D12F30F62}" type="datetimeFigureOut">
               <a:rPr lang="zh-TW" altLang="en-US" smtClean="0"/>
-              <a:t>2021/2/23</a:t>
+              <a:t>2021/3/15</a:t>
             </a:fld>
             <a:endParaRPr lang="zh-TW" altLang="en-US"/>
           </a:p>
@@ -4317,7 +4704,7 @@
           <a:p>
             <a:fld id="{66014C6B-E448-42EA-9D63-082D12F30F62}" type="datetimeFigureOut">
               <a:rPr lang="zh-TW" altLang="en-US" smtClean="0"/>
-              <a:t>2021/2/23</a:t>
+              <a:t>2021/3/15</a:t>
             </a:fld>
             <a:endParaRPr lang="zh-TW" altLang="en-US"/>
           </a:p>
@@ -4546,7 +4933,7 @@
           <a:p>
             <a:fld id="{66014C6B-E448-42EA-9D63-082D12F30F62}" type="datetimeFigureOut">
               <a:rPr lang="zh-TW" altLang="en-US" smtClean="0"/>
-              <a:t>2021/2/23</a:t>
+              <a:t>2021/3/15</a:t>
             </a:fld>
             <a:endParaRPr lang="zh-TW" altLang="en-US"/>
           </a:p>
@@ -4910,7 +5297,7 @@
           <a:p>
             <a:fld id="{66014C6B-E448-42EA-9D63-082D12F30F62}" type="datetimeFigureOut">
               <a:rPr lang="zh-TW" altLang="en-US" smtClean="0"/>
-              <a:t>2021/2/23</a:t>
+              <a:t>2021/3/15</a:t>
             </a:fld>
             <a:endParaRPr lang="zh-TW" altLang="en-US"/>
           </a:p>
@@ -5027,7 +5414,7 @@
           <a:p>
             <a:fld id="{66014C6B-E448-42EA-9D63-082D12F30F62}" type="datetimeFigureOut">
               <a:rPr lang="zh-TW" altLang="en-US" smtClean="0"/>
-              <a:t>2021/2/23</a:t>
+              <a:t>2021/3/15</a:t>
             </a:fld>
             <a:endParaRPr lang="zh-TW" altLang="en-US"/>
           </a:p>
@@ -5122,7 +5509,7 @@
           <a:p>
             <a:fld id="{66014C6B-E448-42EA-9D63-082D12F30F62}" type="datetimeFigureOut">
               <a:rPr lang="zh-TW" altLang="en-US" smtClean="0"/>
-              <a:t>2021/2/23</a:t>
+              <a:t>2021/3/15</a:t>
             </a:fld>
             <a:endParaRPr lang="zh-TW" altLang="en-US"/>
           </a:p>
@@ -5397,7 +5784,7 @@
           <a:p>
             <a:fld id="{66014C6B-E448-42EA-9D63-082D12F30F62}" type="datetimeFigureOut">
               <a:rPr lang="zh-TW" altLang="en-US" smtClean="0"/>
-              <a:t>2021/2/23</a:t>
+              <a:t>2021/3/15</a:t>
             </a:fld>
             <a:endParaRPr lang="zh-TW" altLang="en-US"/>
           </a:p>
@@ -5649,7 +6036,7 @@
           <a:p>
             <a:fld id="{66014C6B-E448-42EA-9D63-082D12F30F62}" type="datetimeFigureOut">
               <a:rPr lang="zh-TW" altLang="en-US" smtClean="0"/>
-              <a:t>2021/2/23</a:t>
+              <a:t>2021/3/15</a:t>
             </a:fld>
             <a:endParaRPr lang="zh-TW" altLang="en-US"/>
           </a:p>
@@ -5860,7 +6247,7 @@
           <a:p>
             <a:fld id="{66014C6B-E448-42EA-9D63-082D12F30F62}" type="datetimeFigureOut">
               <a:rPr lang="zh-TW" altLang="en-US" smtClean="0"/>
-              <a:t>2021/2/23</a:t>
+              <a:t>2021/3/15</a:t>
             </a:fld>
             <a:endParaRPr lang="zh-TW" altLang="en-US"/>
           </a:p>
@@ -6721,6 +7108,672 @@
 <file path=ppt/slides/slide10.xml><?xml version="1.0" encoding="utf-8"?>
 <p:sld xmlns:a="http://schemas.openxmlformats.org/drawingml/2006/main" xmlns:r="http://schemas.openxmlformats.org/officeDocument/2006/relationships" xmlns:p="http://schemas.openxmlformats.org/presentationml/2006/main">
   <p:cSld>
+    <p:spTree>
+      <p:nvGrpSpPr>
+        <p:cNvPr id="1" name=""/>
+        <p:cNvGrpSpPr/>
+        <p:nvPr/>
+      </p:nvGrpSpPr>
+      <p:grpSpPr>
+        <a:xfrm>
+          <a:off x="0" y="0"/>
+          <a:ext cx="0" cy="0"/>
+          <a:chOff x="0" y="0"/>
+          <a:chExt cx="0" cy="0"/>
+        </a:xfrm>
+      </p:grpSpPr>
+      <p:sp>
+        <p:nvSpPr>
+          <p:cNvPr id="2" name="標題 1"/>
+          <p:cNvSpPr>
+            <a:spLocks noGrp="1"/>
+          </p:cNvSpPr>
+          <p:nvPr>
+            <p:ph type="title"/>
+          </p:nvPr>
+        </p:nvSpPr>
+        <p:spPr>
+          <a:xfrm>
+            <a:off x="838200" y="365125"/>
+            <a:ext cx="10515600" cy="1325563"/>
+          </a:xfrm>
+        </p:spPr>
+        <p:txBody>
+          <a:bodyPr/>
+          <a:lstStyle/>
+          <a:p>
+            <a:r>
+              <a:rPr lang="en-US" altLang="zh-TW" dirty="0"/>
+              <a:t>Function introduction (Server)</a:t>
+            </a:r>
+            <a:endParaRPr lang="zh-TW" altLang="en-US" dirty="0"/>
+          </a:p>
+        </p:txBody>
+      </p:sp>
+      <p:sp>
+        <p:nvSpPr>
+          <p:cNvPr id="3" name="內容版面配置區 2"/>
+          <p:cNvSpPr>
+            <a:spLocks noGrp="1"/>
+          </p:cNvSpPr>
+          <p:nvPr>
+            <p:ph idx="1"/>
+          </p:nvPr>
+        </p:nvSpPr>
+        <p:spPr>
+          <a:xfrm>
+            <a:off x="838200" y="1690688"/>
+            <a:ext cx="10515600" cy="4546833"/>
+          </a:xfrm>
+        </p:spPr>
+        <p:txBody>
+          <a:bodyPr>
+            <a:normAutofit lnSpcReduction="10000"/>
+          </a:bodyPr>
+          <a:lstStyle/>
+          <a:p>
+            <a:pPr marL="0" indent="0">
+              <a:buNone/>
+            </a:pPr>
+            <a:r>
+              <a:rPr lang="en-US" altLang="zh-TW" sz="2600" b="1" dirty="0"/>
+              <a:t>int accept (int socket, struct </a:t>
+            </a:r>
+            <a:r>
+              <a:rPr lang="en-US" altLang="zh-TW" sz="2600" b="1" dirty="0" err="1"/>
+              <a:t>sockaddr</a:t>
+            </a:r>
+            <a:r>
+              <a:rPr lang="en-US" altLang="zh-TW" sz="2600" b="1" dirty="0"/>
+              <a:t> *address, </a:t>
+            </a:r>
+            <a:r>
+              <a:rPr lang="en-US" altLang="zh-TW" sz="2600" b="1" dirty="0" err="1"/>
+              <a:t>socklen_t</a:t>
+            </a:r>
+            <a:r>
+              <a:rPr lang="en-US" altLang="zh-TW" sz="2600" b="1" dirty="0"/>
+              <a:t> *</a:t>
+            </a:r>
+            <a:r>
+              <a:rPr lang="en-US" altLang="zh-TW" sz="2600" b="1" dirty="0" err="1"/>
+              <a:t>address_len</a:t>
+            </a:r>
+            <a:r>
+              <a:rPr lang="en-US" altLang="zh-TW" sz="2600" b="1" dirty="0"/>
+              <a:t>); </a:t>
+            </a:r>
+          </a:p>
+          <a:p>
+            <a:r>
+              <a:rPr lang="en-US" altLang="zh-TW" dirty="0"/>
+              <a:t>socket : Specifies a socket that was created with socket(), has been bound to an address with bind(), and has issued a successful call to listen().</a:t>
+            </a:r>
+          </a:p>
+          <a:p>
+            <a:endParaRPr lang="zh-TW" altLang="zh-TW" b="1" dirty="0"/>
+          </a:p>
+          <a:p>
+            <a:r>
+              <a:rPr lang="en-US" altLang="zh-TW" dirty="0"/>
+              <a:t>address:</a:t>
+            </a:r>
+            <a:r>
+              <a:rPr lang="en-US" altLang="zh-TW" b="0" i="0" dirty="0">
+                <a:solidFill>
+                  <a:srgbClr val="000000"/>
+                </a:solidFill>
+                <a:effectLst/>
+                <a:latin typeface="Times New Roman" panose="02020603050405020304" pitchFamily="18" charset="0"/>
+              </a:rPr>
+              <a:t> a pointer to a </a:t>
+            </a:r>
+            <a:r>
+              <a:rPr lang="en-US" altLang="zh-TW" b="1" i="0" dirty="0" err="1">
+                <a:solidFill>
+                  <a:srgbClr val="000000"/>
+                </a:solidFill>
+                <a:effectLst/>
+                <a:latin typeface="Times New Roman" panose="02020603050405020304" pitchFamily="18" charset="0"/>
+              </a:rPr>
+              <a:t>sockaddr</a:t>
+            </a:r>
+            <a:r>
+              <a:rPr lang="en-US" altLang="zh-TW" b="0" i="0" dirty="0">
+                <a:solidFill>
+                  <a:srgbClr val="000000"/>
+                </a:solidFill>
+                <a:effectLst/>
+                <a:latin typeface="Times New Roman" panose="02020603050405020304" pitchFamily="18" charset="0"/>
+              </a:rPr>
+              <a:t> structure where the address of the connecting socket will be returned.</a:t>
+            </a:r>
+          </a:p>
+          <a:p>
+            <a:endParaRPr lang="en-US" altLang="zh-TW" dirty="0"/>
+          </a:p>
+          <a:p>
+            <a:r>
+              <a:rPr lang="en-US" altLang="zh-TW" dirty="0" err="1"/>
+              <a:t>address_len:output</a:t>
+            </a:r>
+            <a:r>
+              <a:rPr lang="en-US" altLang="zh-TW" dirty="0"/>
+              <a:t> specifies the length of the stored address.</a:t>
+            </a:r>
+          </a:p>
+          <a:p>
+            <a:endParaRPr lang="zh-TW" altLang="zh-TW" dirty="0"/>
+          </a:p>
+          <a:p>
+            <a:r>
+              <a:rPr lang="en-US" altLang="zh-TW" dirty="0"/>
+              <a:t>return value: Upon successful completion, accept() returns the nonnegative file descriptor of the accepted socket.</a:t>
+            </a:r>
+          </a:p>
+          <a:p>
+            <a:endParaRPr lang="en-US" altLang="zh-TW" dirty="0"/>
+          </a:p>
+          <a:p>
+            <a:endParaRPr lang="en-US" altLang="zh-TW" dirty="0"/>
+          </a:p>
+          <a:p>
+            <a:pPr lvl="1"/>
+            <a:endParaRPr lang="en-US" altLang="zh-TW" dirty="0"/>
+          </a:p>
+        </p:txBody>
+      </p:sp>
+    </p:spTree>
+    <p:extLst>
+      <p:ext uri="{BB962C8B-B14F-4D97-AF65-F5344CB8AC3E}">
+        <p14:creationId xmlns:p14="http://schemas.microsoft.com/office/powerpoint/2010/main" val="4135273783"/>
+      </p:ext>
+    </p:extLst>
+  </p:cSld>
+  <p:clrMapOvr>
+    <a:masterClrMapping/>
+  </p:clrMapOvr>
+</p:sld>
+</file>
+
+<file path=ppt/slides/slide11.xml><?xml version="1.0" encoding="utf-8"?>
+<p:sld xmlns:a="http://schemas.openxmlformats.org/drawingml/2006/main" xmlns:r="http://schemas.openxmlformats.org/officeDocument/2006/relationships" xmlns:p="http://schemas.openxmlformats.org/presentationml/2006/main">
+  <p:cSld>
+    <p:spTree>
+      <p:nvGrpSpPr>
+        <p:cNvPr id="1" name=""/>
+        <p:cNvGrpSpPr/>
+        <p:nvPr/>
+      </p:nvGrpSpPr>
+      <p:grpSpPr>
+        <a:xfrm>
+          <a:off x="0" y="0"/>
+          <a:ext cx="0" cy="0"/>
+          <a:chOff x="0" y="0"/>
+          <a:chExt cx="0" cy="0"/>
+        </a:xfrm>
+      </p:grpSpPr>
+      <p:sp>
+        <p:nvSpPr>
+          <p:cNvPr id="2" name="標題 1"/>
+          <p:cNvSpPr>
+            <a:spLocks noGrp="1"/>
+          </p:cNvSpPr>
+          <p:nvPr>
+            <p:ph type="title"/>
+          </p:nvPr>
+        </p:nvSpPr>
+        <p:spPr>
+          <a:xfrm>
+            <a:off x="838200" y="365125"/>
+            <a:ext cx="10515600" cy="1325563"/>
+          </a:xfrm>
+        </p:spPr>
+        <p:txBody>
+          <a:bodyPr/>
+          <a:lstStyle/>
+          <a:p>
+            <a:r>
+              <a:rPr lang="en-US" altLang="zh-TW" dirty="0"/>
+              <a:t>Function introduction (Client)</a:t>
+            </a:r>
+            <a:endParaRPr lang="zh-TW" altLang="en-US" dirty="0"/>
+          </a:p>
+        </p:txBody>
+      </p:sp>
+      <p:sp>
+        <p:nvSpPr>
+          <p:cNvPr id="3" name="內容版面配置區 2"/>
+          <p:cNvSpPr>
+            <a:spLocks noGrp="1"/>
+          </p:cNvSpPr>
+          <p:nvPr>
+            <p:ph idx="1"/>
+          </p:nvPr>
+        </p:nvSpPr>
+        <p:spPr>
+          <a:xfrm>
+            <a:off x="838199" y="1690688"/>
+            <a:ext cx="11007055" cy="4546833"/>
+          </a:xfrm>
+        </p:spPr>
+        <p:txBody>
+          <a:bodyPr>
+            <a:normAutofit lnSpcReduction="10000"/>
+          </a:bodyPr>
+          <a:lstStyle/>
+          <a:p>
+            <a:pPr marL="0" indent="0">
+              <a:buNone/>
+            </a:pPr>
+            <a:r>
+              <a:rPr lang="en-US" altLang="zh-TW" sz="2600" b="1" dirty="0"/>
+              <a:t>int connect(int socket, const struct </a:t>
+            </a:r>
+            <a:r>
+              <a:rPr lang="en-US" altLang="zh-TW" sz="2600" b="1" dirty="0" err="1"/>
+              <a:t>sockaddr</a:t>
+            </a:r>
+            <a:r>
+              <a:rPr lang="en-US" altLang="zh-TW" sz="2600" b="1" dirty="0"/>
+              <a:t> *address, </a:t>
+            </a:r>
+            <a:r>
+              <a:rPr lang="en-US" altLang="zh-TW" sz="2600" b="1" dirty="0" err="1"/>
+              <a:t>socklen_t</a:t>
+            </a:r>
+            <a:r>
+              <a:rPr lang="en-US" altLang="zh-TW" sz="2600" b="1" dirty="0"/>
+              <a:t> </a:t>
+            </a:r>
+            <a:r>
+              <a:rPr lang="en-US" altLang="zh-TW" sz="2600" b="1" dirty="0" err="1"/>
+              <a:t>address_len</a:t>
+            </a:r>
+            <a:r>
+              <a:rPr lang="en-US" altLang="zh-TW" sz="2600" b="1" dirty="0"/>
+              <a:t>);</a:t>
+            </a:r>
+          </a:p>
+          <a:p>
+            <a:pPr marL="0" indent="0">
+              <a:buNone/>
+            </a:pPr>
+            <a:r>
+              <a:rPr lang="en-US" altLang="zh-TW" sz="2600" dirty="0"/>
+              <a:t> </a:t>
+            </a:r>
+          </a:p>
+          <a:p>
+            <a:r>
+              <a:rPr lang="en-US" altLang="zh-TW" dirty="0"/>
+              <a:t>socket : Specifies the file descriptor associated with the socket.</a:t>
+            </a:r>
+          </a:p>
+          <a:p>
+            <a:endParaRPr lang="en-US" altLang="zh-TW" dirty="0"/>
+          </a:p>
+          <a:p>
+            <a:r>
+              <a:rPr lang="en-US" altLang="zh-TW" dirty="0"/>
+              <a:t>address:</a:t>
+            </a:r>
+            <a:r>
+              <a:rPr lang="en-US" altLang="zh-TW" b="0" i="0" dirty="0">
+                <a:solidFill>
+                  <a:srgbClr val="000000"/>
+                </a:solidFill>
+                <a:effectLst/>
+                <a:latin typeface="Times New Roman" panose="02020603050405020304" pitchFamily="18" charset="0"/>
+              </a:rPr>
+              <a:t> Points to a </a:t>
+            </a:r>
+            <a:r>
+              <a:rPr lang="en-US" altLang="zh-TW" b="0" i="0" dirty="0" err="1">
+                <a:solidFill>
+                  <a:srgbClr val="000000"/>
+                </a:solidFill>
+                <a:effectLst/>
+                <a:latin typeface="Times New Roman" panose="02020603050405020304" pitchFamily="18" charset="0"/>
+              </a:rPr>
+              <a:t>sockaddr</a:t>
+            </a:r>
+            <a:r>
+              <a:rPr lang="en-US" altLang="zh-TW" b="0" i="0" dirty="0">
+                <a:solidFill>
+                  <a:srgbClr val="000000"/>
+                </a:solidFill>
+                <a:effectLst/>
+                <a:latin typeface="Times New Roman" panose="02020603050405020304" pitchFamily="18" charset="0"/>
+              </a:rPr>
+              <a:t> structure containing the peer address.</a:t>
+            </a:r>
+          </a:p>
+          <a:p>
+            <a:endParaRPr lang="en-US" altLang="zh-TW" dirty="0"/>
+          </a:p>
+          <a:p>
+            <a:r>
+              <a:rPr lang="en-US" altLang="zh-TW" dirty="0" err="1"/>
+              <a:t>address_len</a:t>
+            </a:r>
+            <a:r>
+              <a:rPr lang="en-US" altLang="zh-TW" dirty="0"/>
+              <a:t>:</a:t>
+            </a:r>
+          </a:p>
+          <a:p>
+            <a:pPr marL="457200" lvl="1" indent="0">
+              <a:buNone/>
+            </a:pPr>
+            <a:r>
+              <a:rPr lang="en-US" altLang="zh-TW" dirty="0"/>
+              <a:t>Specifies the length of the </a:t>
+            </a:r>
+            <a:r>
+              <a:rPr lang="en-US" altLang="zh-TW" dirty="0" err="1"/>
+              <a:t>sockaddr</a:t>
+            </a:r>
+            <a:r>
+              <a:rPr lang="en-US" altLang="zh-TW" dirty="0"/>
+              <a:t> structure pointed to by the address argument.</a:t>
+            </a:r>
+          </a:p>
+          <a:p>
+            <a:endParaRPr lang="zh-TW" altLang="zh-TW" dirty="0"/>
+          </a:p>
+          <a:p>
+            <a:r>
+              <a:rPr lang="en-US" altLang="zh-TW" dirty="0"/>
+              <a:t>return value: Upon successful completion, accept() returns the nonnegative file descriptor of the accepted socket.</a:t>
+            </a:r>
+          </a:p>
+          <a:p>
+            <a:endParaRPr lang="en-US" altLang="zh-TW" dirty="0"/>
+          </a:p>
+          <a:p>
+            <a:endParaRPr lang="en-US" altLang="zh-TW" dirty="0"/>
+          </a:p>
+          <a:p>
+            <a:pPr lvl="1"/>
+            <a:endParaRPr lang="en-US" altLang="zh-TW" dirty="0"/>
+          </a:p>
+        </p:txBody>
+      </p:sp>
+    </p:spTree>
+    <p:extLst>
+      <p:ext uri="{BB962C8B-B14F-4D97-AF65-F5344CB8AC3E}">
+        <p14:creationId xmlns:p14="http://schemas.microsoft.com/office/powerpoint/2010/main" val="2881619644"/>
+      </p:ext>
+    </p:extLst>
+  </p:cSld>
+  <p:clrMapOvr>
+    <a:masterClrMapping/>
+  </p:clrMapOvr>
+</p:sld>
+</file>
+
+<file path=ppt/slides/slide12.xml><?xml version="1.0" encoding="utf-8"?>
+<p:sld xmlns:a="http://schemas.openxmlformats.org/drawingml/2006/main" xmlns:r="http://schemas.openxmlformats.org/officeDocument/2006/relationships" xmlns:p="http://schemas.openxmlformats.org/presentationml/2006/main">
+  <p:cSld>
+    <p:spTree>
+      <p:nvGrpSpPr>
+        <p:cNvPr id="1" name=""/>
+        <p:cNvGrpSpPr/>
+        <p:nvPr/>
+      </p:nvGrpSpPr>
+      <p:grpSpPr>
+        <a:xfrm>
+          <a:off x="0" y="0"/>
+          <a:ext cx="0" cy="0"/>
+          <a:chOff x="0" y="0"/>
+          <a:chExt cx="0" cy="0"/>
+        </a:xfrm>
+      </p:grpSpPr>
+      <p:sp>
+        <p:nvSpPr>
+          <p:cNvPr id="2" name="標題 1"/>
+          <p:cNvSpPr>
+            <a:spLocks noGrp="1"/>
+          </p:cNvSpPr>
+          <p:nvPr>
+            <p:ph type="title"/>
+          </p:nvPr>
+        </p:nvSpPr>
+        <p:spPr/>
+        <p:txBody>
+          <a:bodyPr/>
+          <a:lstStyle/>
+          <a:p>
+            <a:r>
+              <a:rPr kumimoji="1" lang="en-US" altLang="zh-TW" dirty="0"/>
+              <a:t>UDP</a:t>
+            </a:r>
+            <a:endParaRPr kumimoji="1" lang="zh-TW" altLang="en-US" dirty="0"/>
+          </a:p>
+        </p:txBody>
+      </p:sp>
+      <p:sp>
+        <p:nvSpPr>
+          <p:cNvPr id="3" name="內容版面配置區 2"/>
+          <p:cNvSpPr>
+            <a:spLocks noGrp="1"/>
+          </p:cNvSpPr>
+          <p:nvPr>
+            <p:ph idx="1"/>
+          </p:nvPr>
+        </p:nvSpPr>
+        <p:spPr/>
+        <p:txBody>
+          <a:bodyPr/>
+          <a:lstStyle/>
+          <a:p>
+            <a:r>
+              <a:rPr kumimoji="1" lang="en-US" altLang="zh-TW" dirty="0">
+                <a:latin typeface="Times New Roman" panose="02020603050405020304" pitchFamily="18" charset="0"/>
+                <a:cs typeface="Times New Roman" panose="02020603050405020304" pitchFamily="18" charset="0"/>
+              </a:rPr>
+              <a:t>UDP (User Datagram Protocol)</a:t>
+            </a:r>
+          </a:p>
+          <a:p>
+            <a:endParaRPr kumimoji="1" lang="en-US" altLang="zh-TW" dirty="0">
+              <a:latin typeface="Times New Roman" panose="02020603050405020304" pitchFamily="18" charset="0"/>
+              <a:cs typeface="Times New Roman" panose="02020603050405020304" pitchFamily="18" charset="0"/>
+            </a:endParaRPr>
+          </a:p>
+          <a:p>
+            <a:r>
+              <a:rPr kumimoji="1" lang="en-US" altLang="zh-TW" dirty="0">
+                <a:latin typeface="Times New Roman" panose="02020603050405020304" pitchFamily="18" charset="0"/>
+                <a:cs typeface="Times New Roman" panose="02020603050405020304" pitchFamily="18" charset="0"/>
+              </a:rPr>
+              <a:t>Unreliable</a:t>
+            </a:r>
+            <a:r>
+              <a:rPr kumimoji="1" lang="zh-TW" altLang="en-US" dirty="0">
+                <a:latin typeface="Times New Roman" panose="02020603050405020304" pitchFamily="18" charset="0"/>
+                <a:cs typeface="Times New Roman" panose="02020603050405020304" pitchFamily="18" charset="0"/>
+              </a:rPr>
+              <a:t> </a:t>
+            </a:r>
+            <a:r>
+              <a:rPr kumimoji="1" lang="en-US" altLang="zh-TW" dirty="0">
+                <a:latin typeface="Times New Roman" panose="02020603050405020304" pitchFamily="18" charset="0"/>
+                <a:cs typeface="Times New Roman" panose="02020603050405020304" pitchFamily="18" charset="0"/>
+              </a:rPr>
+              <a:t>and</a:t>
+            </a:r>
+            <a:r>
+              <a:rPr kumimoji="1" lang="zh-TW" altLang="en-US" dirty="0">
+                <a:latin typeface="Times New Roman" panose="02020603050405020304" pitchFamily="18" charset="0"/>
+                <a:cs typeface="Times New Roman" panose="02020603050405020304" pitchFamily="18" charset="0"/>
+              </a:rPr>
+              <a:t> </a:t>
+            </a:r>
+            <a:r>
+              <a:rPr kumimoji="1" lang="en-US" altLang="zh-TW" dirty="0">
+                <a:latin typeface="Times New Roman" panose="02020603050405020304" pitchFamily="18" charset="0"/>
+                <a:cs typeface="Times New Roman" panose="02020603050405020304" pitchFamily="18" charset="0"/>
+              </a:rPr>
+              <a:t>more</a:t>
+            </a:r>
+            <a:r>
+              <a:rPr kumimoji="1" lang="zh-TW" altLang="en-US" dirty="0">
+                <a:latin typeface="Times New Roman" panose="02020603050405020304" pitchFamily="18" charset="0"/>
+                <a:cs typeface="Times New Roman" panose="02020603050405020304" pitchFamily="18" charset="0"/>
+              </a:rPr>
+              <a:t> </a:t>
+            </a:r>
+            <a:r>
+              <a:rPr kumimoji="1" lang="en-US" altLang="zh-TW" dirty="0">
+                <a:latin typeface="Times New Roman" panose="02020603050405020304" pitchFamily="18" charset="0"/>
+                <a:cs typeface="Times New Roman" panose="02020603050405020304" pitchFamily="18" charset="0"/>
+              </a:rPr>
+              <a:t>fast</a:t>
+            </a:r>
+          </a:p>
+          <a:p>
+            <a:endParaRPr kumimoji="1" lang="en-US" altLang="zh-TW" dirty="0">
+              <a:latin typeface="Times New Roman" panose="02020603050405020304" pitchFamily="18" charset="0"/>
+              <a:cs typeface="Times New Roman" panose="02020603050405020304" pitchFamily="18" charset="0"/>
+            </a:endParaRPr>
+          </a:p>
+          <a:p>
+            <a:r>
+              <a:rPr lang="en-US" dirty="0">
+                <a:latin typeface="Times New Roman" panose="02020603050405020304" pitchFamily="18" charset="0"/>
+                <a:cs typeface="Times New Roman" panose="02020603050405020304" pitchFamily="18" charset="0"/>
+              </a:rPr>
+              <a:t>No guarantee of transferring data bits or packets in an arranged manner(compare with TCP)</a:t>
+            </a:r>
+          </a:p>
+          <a:p>
+            <a:endParaRPr kumimoji="1" lang="zh-TW" altLang="en-US" dirty="0">
+              <a:latin typeface="Times New Roman" panose="02020603050405020304" pitchFamily="18" charset="0"/>
+              <a:cs typeface="Times New Roman" panose="02020603050405020304" pitchFamily="18" charset="0"/>
+            </a:endParaRPr>
+          </a:p>
+        </p:txBody>
+      </p:sp>
+    </p:spTree>
+    <p:extLst>
+      <p:ext uri="{BB962C8B-B14F-4D97-AF65-F5344CB8AC3E}">
+        <p14:creationId xmlns:p14="http://schemas.microsoft.com/office/powerpoint/2010/main" val="3789497580"/>
+      </p:ext>
+    </p:extLst>
+  </p:cSld>
+  <p:clrMapOvr>
+    <a:masterClrMapping/>
+  </p:clrMapOvr>
+</p:sld>
+</file>
+
+<file path=ppt/slides/slide13.xml><?xml version="1.0" encoding="utf-8"?>
+<p:sld xmlns:a="http://schemas.openxmlformats.org/drawingml/2006/main" xmlns:r="http://schemas.openxmlformats.org/officeDocument/2006/relationships" xmlns:p="http://schemas.openxmlformats.org/presentationml/2006/main">
+  <p:cSld>
+    <p:spTree>
+      <p:nvGrpSpPr>
+        <p:cNvPr id="1" name=""/>
+        <p:cNvGrpSpPr/>
+        <p:nvPr/>
+      </p:nvGrpSpPr>
+      <p:grpSpPr>
+        <a:xfrm>
+          <a:off x="0" y="0"/>
+          <a:ext cx="0" cy="0"/>
+          <a:chOff x="0" y="0"/>
+          <a:chExt cx="0" cy="0"/>
+        </a:xfrm>
+      </p:grpSpPr>
+      <p:sp>
+        <p:nvSpPr>
+          <p:cNvPr id="2" name="標題 1"/>
+          <p:cNvSpPr>
+            <a:spLocks noGrp="1"/>
+          </p:cNvSpPr>
+          <p:nvPr>
+            <p:ph type="title"/>
+          </p:nvPr>
+        </p:nvSpPr>
+        <p:spPr/>
+        <p:txBody>
+          <a:bodyPr/>
+          <a:lstStyle/>
+          <a:p>
+            <a:r>
+              <a:rPr lang="en-US" altLang="zh-TW" dirty="0"/>
+              <a:t>UDP</a:t>
+            </a:r>
+            <a:r>
+              <a:rPr lang="zh-TW" altLang="en-US" dirty="0"/>
+              <a:t> </a:t>
+            </a:r>
+            <a:r>
+              <a:rPr lang="en-US" altLang="zh-TW" dirty="0"/>
+              <a:t>Flow (connectionless)</a:t>
+            </a:r>
+            <a:endParaRPr lang="zh-TW" altLang="en-US" dirty="0"/>
+          </a:p>
+        </p:txBody>
+      </p:sp>
+      <p:pic>
+        <p:nvPicPr>
+          <p:cNvPr id="2050" name="Picture 2" descr="http://pic.pimg.tw/kezeodsnx/4a83b8bcbf9da.png"/>
+          <p:cNvPicPr>
+            <a:picLocks noChangeAspect="1" noChangeArrowheads="1"/>
+          </p:cNvPicPr>
+          <p:nvPr/>
+        </p:nvPicPr>
+        <p:blipFill>
+          <a:blip r:embed="rId2">
+            <a:extLst>
+              <a:ext uri="{28A0092B-C50C-407E-A947-70E740481C1C}">
+                <a14:useLocalDpi xmlns:a14="http://schemas.microsoft.com/office/drawing/2010/main" val="0"/>
+              </a:ext>
+            </a:extLst>
+          </a:blip>
+          <a:srcRect/>
+          <a:stretch>
+            <a:fillRect/>
+          </a:stretch>
+        </p:blipFill>
+        <p:spPr bwMode="auto">
+          <a:xfrm>
+            <a:off x="3453136" y="1689729"/>
+            <a:ext cx="5285727" cy="4623130"/>
+          </a:xfrm>
+          <a:prstGeom prst="rect">
+            <a:avLst/>
+          </a:prstGeom>
+          <a:noFill/>
+          <a:extLst>
+            <a:ext uri="{909E8E84-426E-40dd-AFC4-6F175D3DCCD1}">
+              <a14:hiddenFill xmlns:a14="http://schemas.microsoft.com/office/drawing/2010/main" xmlns="">
+                <a:solidFill>
+                  <a:srgbClr val="FFFFFF"/>
+                </a:solidFill>
+              </a14:hiddenFill>
+            </a:ext>
+          </a:extLst>
+        </p:spPr>
+      </p:pic>
+    </p:spTree>
+    <p:extLst>
+      <p:ext uri="{BB962C8B-B14F-4D97-AF65-F5344CB8AC3E}">
+        <p14:creationId xmlns:p14="http://schemas.microsoft.com/office/powerpoint/2010/main" val="853172571"/>
+      </p:ext>
+    </p:extLst>
+  </p:cSld>
+  <p:clrMapOvr>
+    <a:masterClrMapping/>
+  </p:clrMapOvr>
+</p:sld>
+</file>
+
+<file path=ppt/slides/slide14.xml><?xml version="1.0" encoding="utf-8"?>
+<p:sld xmlns:a="http://schemas.openxmlformats.org/drawingml/2006/main" xmlns:r="http://schemas.openxmlformats.org/officeDocument/2006/relationships" xmlns:p="http://schemas.openxmlformats.org/presentationml/2006/main">
+  <p:cSld>
     <p:bg>
       <p:bgPr>
         <a:solidFill>
@@ -6952,7 +8005,7 @@
 </p:sld>
 </file>
 
-<file path=ppt/slides/slide11.xml><?xml version="1.0" encoding="utf-8"?>
+<file path=ppt/slides/slide15.xml><?xml version="1.0" encoding="utf-8"?>
 <p:sld xmlns:a="http://schemas.openxmlformats.org/drawingml/2006/main" xmlns:r="http://schemas.openxmlformats.org/officeDocument/2006/relationships" xmlns:p="http://schemas.openxmlformats.org/presentationml/2006/main">
   <p:cSld>
     <p:spTree>
@@ -9923,7 +10976,7 @@
 </p:sld>
 </file>
 
-<file path=ppt/slides/slide12.xml><?xml version="1.0" encoding="utf-8"?>
+<file path=ppt/slides/slide16.xml><?xml version="1.0" encoding="utf-8"?>
 <p:sld xmlns:a="http://schemas.openxmlformats.org/drawingml/2006/main" xmlns:r="http://schemas.openxmlformats.org/officeDocument/2006/relationships" xmlns:p="http://schemas.openxmlformats.org/presentationml/2006/main">
   <p:cSld>
     <p:spTree>
@@ -9957,7 +11010,7 @@
           <a:p>
             <a:r>
               <a:rPr kumimoji="1" lang="en-US" altLang="zh-TW" dirty="0"/>
-              <a:t>TCP demo</a:t>
+              <a:t>TCP example</a:t>
             </a:r>
             <a:endParaRPr kumimoji="1" lang="zh-TW" altLang="en-US" dirty="0"/>
           </a:p>
@@ -10129,7 +11182,7 @@
 </p:sld>
 </file>
 
-<file path=ppt/slides/slide13.xml><?xml version="1.0" encoding="utf-8"?>
+<file path=ppt/slides/slide17.xml><?xml version="1.0" encoding="utf-8"?>
 <p:sld xmlns:a="http://schemas.openxmlformats.org/drawingml/2006/main" xmlns:r="http://schemas.openxmlformats.org/officeDocument/2006/relationships" xmlns:p="http://schemas.openxmlformats.org/presentationml/2006/main">
   <p:cSld>
     <p:spTree>
@@ -10163,7 +11216,7 @@
           <a:p>
             <a:r>
               <a:rPr lang="en-US" altLang="zh-TW" dirty="0"/>
-              <a:t>UDP demo</a:t>
+              <a:t>UDP example</a:t>
             </a:r>
             <a:endParaRPr lang="zh-TW" altLang="en-US" dirty="0"/>
           </a:p>
@@ -10293,7 +11346,7 @@
 </p:sld>
 </file>
 
-<file path=ppt/slides/slide14.xml><?xml version="1.0" encoding="utf-8"?>
+<file path=ppt/slides/slide18.xml><?xml version="1.0" encoding="utf-8"?>
 <p:sld xmlns:a="http://schemas.openxmlformats.org/drawingml/2006/main" xmlns:r="http://schemas.openxmlformats.org/officeDocument/2006/relationships" xmlns:p="http://schemas.openxmlformats.org/presentationml/2006/main">
   <p:cSld>
     <p:bg>
@@ -10996,7 +12049,7 @@
                 </a:solidFill>
                 <a:ea typeface="微軟正黑體" panose="020B0604030504040204" pitchFamily="34" charset="-120"/>
               </a:rPr>
-              <a:t>程式碼需附上詳細的註解</a:t>
+              <a:t>程式碼需附上註解</a:t>
             </a:r>
             <a:endParaRPr lang="en-US" altLang="zh-TW" sz="2000" dirty="0">
               <a:solidFill>
@@ -11021,7 +12074,7 @@
                 </a:solidFill>
                 <a:ea typeface="微軟正黑體" panose="020B0604030504040204" pitchFamily="34" charset="-120"/>
               </a:rPr>
-              <a:t>傳送之檔案，大小需大於</a:t>
+              <a:t>傳送之檔案需大於</a:t>
             </a:r>
             <a:r>
               <a:rPr lang="en-US" altLang="zh-TW" sz="2000" dirty="0">
@@ -11086,9 +12139,9 @@
             </a:r>
           </a:p>
           <a:p>
-            <a:pPr marL="914400" lvl="1" indent="-457200">
-              <a:buFont typeface="+mj-lt"/>
-              <a:buAutoNum type="arabicPeriod"/>
+            <a:pPr lvl="1">
+              <a:buFont typeface="Wingdings" panose="05000000000000000000" pitchFamily="2" charset="2"/>
+              <a:buChar char="ü"/>
             </a:pPr>
             <a:r>
               <a:rPr lang="zh-TW" altLang="en-US" sz="1600" dirty="0">
@@ -11136,9 +12189,9 @@
             </a:r>
           </a:p>
           <a:p>
-            <a:pPr marL="914400" lvl="1" indent="-457200">
-              <a:buFont typeface="+mj-lt"/>
-              <a:buAutoNum type="arabicPeriod"/>
+            <a:pPr lvl="1">
+              <a:buFont typeface="Wingdings" panose="05000000000000000000" pitchFamily="2" charset="2"/>
+              <a:buChar char="ü"/>
             </a:pPr>
             <a:r>
               <a:rPr lang="zh-TW" altLang="en-US" sz="1600" dirty="0">
@@ -11186,9 +12239,9 @@
             </a:r>
           </a:p>
           <a:p>
-            <a:pPr marL="914400" lvl="1" indent="-457200">
-              <a:buFont typeface="+mj-lt"/>
-              <a:buAutoNum type="arabicPeriod"/>
+            <a:pPr lvl="1">
+              <a:buFont typeface="Wingdings" panose="05000000000000000000" pitchFamily="2" charset="2"/>
+              <a:buChar char="ü"/>
             </a:pPr>
             <a:r>
               <a:rPr lang="zh-TW" altLang="en-US" sz="1600" dirty="0">
@@ -11211,21 +12264,10 @@
             </a:endParaRPr>
           </a:p>
           <a:p>
-            <a:pPr marL="914400" lvl="1" indent="-457200">
-              <a:buFont typeface="+mj-lt"/>
-              <a:buAutoNum type="arabicPeriod"/>
+            <a:pPr lvl="1">
+              <a:buFont typeface="Wingdings" panose="05000000000000000000" pitchFamily="2" charset="2"/>
+              <a:buChar char="ü"/>
             </a:pPr>
-            <a:r>
-              <a:rPr lang="en-US" altLang="zh-TW" sz="1600" dirty="0" err="1">
-                <a:solidFill>
-                  <a:schemeClr val="tx1">
-                    <a:alpha val="80000"/>
-                  </a:schemeClr>
-                </a:solidFill>
-                <a:ea typeface="微軟正黑體" panose="020B0604030504040204" pitchFamily="34" charset="-120"/>
-              </a:rPr>
-              <a:t>Tcp</a:t>
-            </a:r>
             <a:r>
               <a:rPr lang="en-US" altLang="zh-TW" sz="1600" dirty="0">
                 <a:solidFill>
@@ -11235,7 +12277,7 @@
                 </a:solidFill>
                 <a:ea typeface="微軟正黑體" panose="020B0604030504040204" pitchFamily="34" charset="-120"/>
               </a:rPr>
-              <a:t> </a:t>
+              <a:t>UDP </a:t>
             </a:r>
             <a:r>
               <a:rPr lang="zh-TW" altLang="en-US" sz="1600" dirty="0">
@@ -11246,18 +12288,7 @@
                 </a:solidFill>
                 <a:ea typeface="微軟正黑體" panose="020B0604030504040204" pitchFamily="34" charset="-120"/>
               </a:rPr>
-              <a:t>和 </a:t>
-            </a:r>
-            <a:r>
-              <a:rPr lang="en-US" altLang="zh-TW" sz="1600" dirty="0" err="1">
-                <a:solidFill>
-                  <a:schemeClr val="tx1">
-                    <a:alpha val="80000"/>
-                  </a:schemeClr>
-                </a:solidFill>
-                <a:ea typeface="微軟正黑體" panose="020B0604030504040204" pitchFamily="34" charset="-120"/>
-              </a:rPr>
-              <a:t>udp</a:t>
+              <a:t>需額外紀錄</a:t>
             </a:r>
             <a:r>
               <a:rPr lang="en-US" altLang="zh-TW" sz="1600" dirty="0">
@@ -11268,27 +12299,8 @@
                 </a:solidFill>
                 <a:ea typeface="微軟正黑體" panose="020B0604030504040204" pitchFamily="34" charset="-120"/>
               </a:rPr>
-              <a:t> </a:t>
-            </a:r>
-            <a:r>
-              <a:rPr lang="zh-TW" altLang="en-US" sz="1600" dirty="0">
-                <a:solidFill>
-                  <a:schemeClr val="tx1">
-                    <a:alpha val="80000"/>
-                  </a:schemeClr>
-                </a:solidFill>
-                <a:ea typeface="微軟正黑體" panose="020B0604030504040204" pitchFamily="34" charset="-120"/>
-              </a:rPr>
-              <a:t>各執行過程</a:t>
-            </a:r>
-            <a:endParaRPr lang="en-US" altLang="zh-TW" sz="1600" dirty="0">
-              <a:solidFill>
-                <a:schemeClr val="tx1">
-                  <a:alpha val="80000"/>
-                </a:schemeClr>
-              </a:solidFill>
-              <a:ea typeface="微軟正黑體" panose="020B0604030504040204" pitchFamily="34" charset="-120"/>
-            </a:endParaRPr>
+              <a:t>packet loss rate.</a:t>
+            </a:r>
           </a:p>
           <a:p>
             <a:pPr marL="457200" lvl="1" indent="0">
@@ -11508,7 +12520,7 @@
         </p:blipFill>
         <p:spPr>
           <a:xfrm>
-            <a:off x="6915841" y="4642528"/>
+            <a:off x="6393548" y="5064914"/>
             <a:ext cx="2419394" cy="1512121"/>
           </a:xfrm>
           <a:prstGeom prst="rect">
@@ -11516,6 +12528,42 @@
           </a:prstGeom>
         </p:spPr>
       </p:pic>
+      <p:sp>
+        <p:nvSpPr>
+          <p:cNvPr id="7" name="文字方塊 6">
+            <a:extLst>
+              <a:ext uri="{FF2B5EF4-FFF2-40B4-BE49-F238E27FC236}">
+                <a16:creationId xmlns:a16="http://schemas.microsoft.com/office/drawing/2014/main" id="{9E7D53CF-C4B6-468B-BF78-F594756F3946}"/>
+              </a:ext>
+            </a:extLst>
+          </p:cNvPr>
+          <p:cNvSpPr txBox="1"/>
+          <p:nvPr/>
+        </p:nvSpPr>
+        <p:spPr>
+          <a:xfrm>
+            <a:off x="8909257" y="6207703"/>
+            <a:ext cx="1459686" cy="369332"/>
+          </a:xfrm>
+          <a:prstGeom prst="rect">
+            <a:avLst/>
+          </a:prstGeom>
+          <a:noFill/>
+        </p:spPr>
+        <p:txBody>
+          <a:bodyPr wrap="square" rtlCol="0">
+            <a:spAutoFit/>
+          </a:bodyPr>
+          <a:lstStyle/>
+          <a:p>
+            <a:r>
+              <a:rPr lang="en-US" altLang="zh-TW" dirty="0"/>
+              <a:t>TCP example</a:t>
+            </a:r>
+            <a:endParaRPr lang="zh-TW" altLang="en-US" dirty="0"/>
+          </a:p>
+        </p:txBody>
+      </p:sp>
     </p:spTree>
     <p:extLst>
       <p:ext uri="{BB962C8B-B14F-4D97-AF65-F5344CB8AC3E}">
@@ -11529,7 +12577,7 @@
 </p:sld>
 </file>
 
-<file path=ppt/slides/slide15.xml><?xml version="1.0" encoding="utf-8"?>
+<file path=ppt/slides/slide19.xml><?xml version="1.0" encoding="utf-8"?>
 <p:sld xmlns:a="http://schemas.openxmlformats.org/drawingml/2006/main" xmlns:r="http://schemas.openxmlformats.org/officeDocument/2006/relationships" xmlns:p="http://schemas.openxmlformats.org/presentationml/2006/main">
   <p:cSld>
     <p:spTree>
@@ -11634,20 +12682,16 @@
               <a:t>依序為</a:t>
             </a:r>
             <a:r>
-              <a:rPr lang="en-US" altLang="zh-TW" dirty="0" err="1"/>
-              <a:t>tcp</a:t>
+              <a:rPr lang="en-US" altLang="zh-TW" dirty="0"/>
+              <a:t>TCP</a:t>
             </a:r>
             <a:r>
               <a:rPr lang="zh-TW" altLang="en-US" dirty="0"/>
               <a:t>或</a:t>
             </a:r>
             <a:r>
-              <a:rPr lang="en-US" altLang="zh-TW" dirty="0" err="1"/>
-              <a:t>udp</a:t>
-            </a:r>
-            <a:r>
               <a:rPr lang="en-US" altLang="zh-TW" dirty="0"/>
-              <a:t>, </a:t>
+              <a:t>UDP, </a:t>
             </a:r>
             <a:r>
               <a:rPr lang="zh-TW" altLang="en-US" dirty="0"/>
@@ -11822,7 +12866,249 @@
 </p:sld>
 </file>
 
-<file path=ppt/slides/slide16.xml><?xml version="1.0" encoding="utf-8"?>
+<file path=ppt/slides/slide2.xml><?xml version="1.0" encoding="utf-8"?>
+<p:sld xmlns:a="http://schemas.openxmlformats.org/drawingml/2006/main" xmlns:r="http://schemas.openxmlformats.org/officeDocument/2006/relationships" xmlns:p="http://schemas.openxmlformats.org/presentationml/2006/main">
+  <p:cSld>
+    <p:bg>
+      <p:bgPr>
+        <a:solidFill>
+          <a:schemeClr val="bg1"/>
+        </a:solidFill>
+        <a:effectLst/>
+      </p:bgPr>
+    </p:bg>
+    <p:spTree>
+      <p:nvGrpSpPr>
+        <p:cNvPr id="1" name=""/>
+        <p:cNvGrpSpPr/>
+        <p:nvPr/>
+      </p:nvGrpSpPr>
+      <p:grpSpPr>
+        <a:xfrm>
+          <a:off x="0" y="0"/>
+          <a:ext cx="0" cy="0"/>
+          <a:chOff x="0" y="0"/>
+          <a:chExt cx="0" cy="0"/>
+        </a:xfrm>
+      </p:grpSpPr>
+      <p:sp>
+        <p:nvSpPr>
+          <p:cNvPr id="8" name="Rectangle 7">
+            <a:extLst>
+              <a:ext uri="{FF2B5EF4-FFF2-40B4-BE49-F238E27FC236}">
+                <a16:creationId xmlns:a16="http://schemas.microsoft.com/office/drawing/2014/main" id="{23962611-DFD5-4092-AAFD-559E3DFCE2C9}"/>
+              </a:ext>
+              <a:ext uri="{C183D7F6-B498-43B3-948B-1728B52AA6E4}">
+                <adec:decorative xmlns:adec="http://schemas.microsoft.com/office/drawing/2017/decorative" val="1"/>
+              </a:ext>
+            </a:extLst>
+          </p:cNvPr>
+          <p:cNvSpPr>
+            <a:spLocks noGrp="1" noRot="1" noChangeAspect="1" noMove="1" noResize="1" noEditPoints="1" noAdjustHandles="1" noChangeArrowheads="1" noChangeShapeType="1" noTextEdit="1"/>
+          </p:cNvSpPr>
+          <p:nvPr>
+            <p:extLst>
+              <p:ext uri="{386F3935-93C4-4BCD-93E2-E3B085C9AB24}">
+                <p16:designElem xmlns:p16="http://schemas.microsoft.com/office/powerpoint/2015/main" val="1"/>
+              </p:ext>
+            </p:extLst>
+          </p:nvPr>
+        </p:nvSpPr>
+        <p:spPr>
+          <a:xfrm>
+            <a:off x="475488" y="0"/>
+            <a:ext cx="10910292" cy="6858000"/>
+          </a:xfrm>
+          <a:prstGeom prst="rect">
+            <a:avLst/>
+          </a:prstGeom>
+          <a:gradFill>
+            <a:gsLst>
+              <a:gs pos="0">
+                <a:schemeClr val="accent1">
+                  <a:lumMod val="90000"/>
+                </a:schemeClr>
+              </a:gs>
+              <a:gs pos="25000">
+                <a:schemeClr val="accent1">
+                  <a:lumMod val="90000"/>
+                </a:schemeClr>
+              </a:gs>
+              <a:gs pos="94000">
+                <a:schemeClr val="bg2">
+                  <a:lumMod val="25000"/>
+                </a:schemeClr>
+              </a:gs>
+              <a:gs pos="100000">
+                <a:schemeClr val="bg2">
+                  <a:lumMod val="25000"/>
+                </a:schemeClr>
+              </a:gs>
+            </a:gsLst>
+            <a:lin ang="4200000" scaled="0"/>
+          </a:gradFill>
+          <a:ln>
+            <a:noFill/>
+          </a:ln>
+        </p:spPr>
+        <p:style>
+          <a:lnRef idx="2">
+            <a:schemeClr val="accent1">
+              <a:shade val="50000"/>
+            </a:schemeClr>
+          </a:lnRef>
+          <a:fillRef idx="1">
+            <a:schemeClr val="accent1"/>
+          </a:fillRef>
+          <a:effectRef idx="0">
+            <a:schemeClr val="accent1"/>
+          </a:effectRef>
+          <a:fontRef idx="minor">
+            <a:schemeClr val="lt1"/>
+          </a:fontRef>
+        </p:style>
+        <p:txBody>
+          <a:bodyPr rtlCol="0" anchor="ctr"/>
+          <a:lstStyle/>
+          <a:p>
+            <a:pPr algn="ctr"/>
+            <a:endParaRPr lang="en-US"/>
+          </a:p>
+        </p:txBody>
+      </p:sp>
+      <p:pic>
+        <p:nvPicPr>
+          <p:cNvPr id="10" name="Picture 9">
+            <a:extLst>
+              <a:ext uri="{FF2B5EF4-FFF2-40B4-BE49-F238E27FC236}">
+                <a16:creationId xmlns:a16="http://schemas.microsoft.com/office/drawing/2014/main" id="{2270F1FA-0425-408F-9861-80BF5AFB276D}"/>
+              </a:ext>
+              <a:ext uri="{C183D7F6-B498-43B3-948B-1728B52AA6E4}">
+                <adec:decorative xmlns:adec="http://schemas.microsoft.com/office/drawing/2017/decorative" val="1"/>
+              </a:ext>
+            </a:extLst>
+          </p:cNvPr>
+          <p:cNvPicPr>
+            <a:picLocks noGrp="1" noRot="1" noChangeAspect="1" noMove="1" noResize="1" noEditPoints="1" noAdjustHandles="1" noChangeArrowheads="1" noChangeShapeType="1" noCrop="1"/>
+          </p:cNvPicPr>
+          <p:nvPr>
+            <p:extLst>
+              <p:ext uri="{386F3935-93C4-4BCD-93E2-E3B085C9AB24}">
+                <p16:designElem xmlns:p16="http://schemas.microsoft.com/office/powerpoint/2015/main" val="1"/>
+              </p:ext>
+            </p:extLst>
+          </p:nvPr>
+        </p:nvPicPr>
+        <p:blipFill>
+          <a:blip r:embed="rId2">
+            <a:extLst>
+              <a:ext uri="{28A0092B-C50C-407E-A947-70E740481C1C}">
+                <a14:useLocalDpi xmlns:a14="http://schemas.microsoft.com/office/drawing/2010/main" val="0"/>
+              </a:ext>
+            </a:extLst>
+          </a:blip>
+          <a:stretch>
+            <a:fillRect/>
+          </a:stretch>
+        </p:blipFill>
+        <p:spPr>
+          <a:xfrm>
+            <a:off x="0" y="0"/>
+            <a:ext cx="12192000" cy="6858000"/>
+          </a:xfrm>
+          <a:prstGeom prst="rect">
+            <a:avLst/>
+          </a:prstGeom>
+        </p:spPr>
+      </p:pic>
+      <p:sp>
+        <p:nvSpPr>
+          <p:cNvPr id="2" name="標題 1"/>
+          <p:cNvSpPr>
+            <a:spLocks noGrp="1"/>
+          </p:cNvSpPr>
+          <p:nvPr>
+            <p:ph type="ctrTitle"/>
+          </p:nvPr>
+        </p:nvSpPr>
+        <p:spPr>
+          <a:xfrm>
+            <a:off x="3045368" y="2043663"/>
+            <a:ext cx="6105194" cy="2031055"/>
+          </a:xfrm>
+        </p:spPr>
+        <p:txBody>
+          <a:bodyPr>
+            <a:normAutofit/>
+          </a:bodyPr>
+          <a:lstStyle/>
+          <a:p>
+            <a:r>
+              <a:rPr lang="en-US" altLang="zh-TW">
+                <a:solidFill>
+                  <a:srgbClr val="FFFFFF"/>
+                </a:solidFill>
+                <a:latin typeface="Times New Roman" panose="02020603050405020304" pitchFamily="18" charset="0"/>
+                <a:cs typeface="Times New Roman" panose="02020603050405020304" pitchFamily="18" charset="0"/>
+              </a:rPr>
+              <a:t>Socket programming</a:t>
+            </a:r>
+            <a:endParaRPr lang="zh-TW" altLang="en-US">
+              <a:solidFill>
+                <a:srgbClr val="FFFFFF"/>
+              </a:solidFill>
+              <a:latin typeface="Times New Roman" panose="02020603050405020304" pitchFamily="18" charset="0"/>
+              <a:cs typeface="Times New Roman" panose="02020603050405020304" pitchFamily="18" charset="0"/>
+            </a:endParaRPr>
+          </a:p>
+        </p:txBody>
+      </p:sp>
+      <p:sp>
+        <p:nvSpPr>
+          <p:cNvPr id="3" name="副標題 2"/>
+          <p:cNvSpPr>
+            <a:spLocks noGrp="1"/>
+          </p:cNvSpPr>
+          <p:nvPr>
+            <p:ph type="subTitle" idx="1"/>
+          </p:nvPr>
+        </p:nvSpPr>
+        <p:spPr>
+          <a:xfrm>
+            <a:off x="3045368" y="4074718"/>
+            <a:ext cx="6105194" cy="682079"/>
+          </a:xfrm>
+        </p:spPr>
+        <p:txBody>
+          <a:bodyPr>
+            <a:normAutofit/>
+          </a:bodyPr>
+          <a:lstStyle/>
+          <a:p>
+            <a:endParaRPr lang="zh-TW" altLang="en-US">
+              <a:solidFill>
+                <a:srgbClr val="FFFFFF"/>
+              </a:solidFill>
+              <a:latin typeface="Times New Roman" panose="02020603050405020304" pitchFamily="18" charset="0"/>
+              <a:cs typeface="Times New Roman" panose="02020603050405020304" pitchFamily="18" charset="0"/>
+            </a:endParaRPr>
+          </a:p>
+        </p:txBody>
+      </p:sp>
+    </p:spTree>
+    <p:extLst>
+      <p:ext uri="{BB962C8B-B14F-4D97-AF65-F5344CB8AC3E}">
+        <p14:creationId xmlns:p14="http://schemas.microsoft.com/office/powerpoint/2010/main" val="3274544832"/>
+      </p:ext>
+    </p:extLst>
+  </p:cSld>
+  <p:clrMapOvr>
+    <a:masterClrMapping/>
+  </p:clrMapOvr>
+</p:sld>
+</file>
+
+<file path=ppt/slides/slide20.xml><?xml version="1.0" encoding="utf-8"?>
 <p:sld xmlns:a="http://schemas.openxmlformats.org/drawingml/2006/main" xmlns:r="http://schemas.openxmlformats.org/officeDocument/2006/relationships" xmlns:p="http://schemas.openxmlformats.org/presentationml/2006/main">
   <p:cSld>
     <p:bg>
@@ -12570,7 +13856,7 @@
                 <a:latin typeface="微軟正黑體" panose="020B0604030504040204" pitchFamily="34" charset="-120"/>
                 <a:ea typeface="微軟正黑體" panose="020B0604030504040204" pitchFamily="34" charset="-120"/>
               </a:rPr>
-              <a:t>檔，總共需要上傳兩個檔案</a:t>
+              <a:t>檔，需要上傳檔案</a:t>
             </a:r>
             <a:r>
               <a:rPr lang="en-US" altLang="zh-TW" sz="2000" dirty="0">
@@ -12582,7 +13868,7 @@
                 <a:latin typeface="微軟正黑體" panose="020B0604030504040204" pitchFamily="34" charset="-120"/>
                 <a:ea typeface="微軟正黑體" panose="020B0604030504040204" pitchFamily="34" charset="-120"/>
               </a:rPr>
-              <a:t>(ppt + code)</a:t>
+              <a:t>(1)ppt (2)code</a:t>
             </a:r>
           </a:p>
           <a:p>
@@ -12600,7 +13886,7 @@
                 <a:latin typeface="微軟正黑體" panose="020B0604030504040204" pitchFamily="34" charset="-120"/>
                 <a:ea typeface="微軟正黑體" panose="020B0604030504040204" pitchFamily="34" charset="-120"/>
               </a:rPr>
-              <a:t>將兩個檔案壓縮</a:t>
+              <a:t>將檔案壓縮</a:t>
             </a:r>
             <a:r>
               <a:rPr lang="en-US" altLang="zh-TW" sz="2000" dirty="0">
@@ -12662,7 +13948,7 @@
                 <a:latin typeface="微軟正黑體" panose="020B0604030504040204" pitchFamily="34" charset="-120"/>
                 <a:ea typeface="微軟正黑體" panose="020B0604030504040204" pitchFamily="34" charset="-120"/>
               </a:rPr>
-              <a:t>例如 </a:t>
+              <a:t>例如</a:t>
             </a:r>
             <a:r>
               <a:rPr lang="en-US" altLang="zh-TW" sz="2000" dirty="0">
@@ -12674,10 +13960,10 @@
                 <a:latin typeface="微軟正黑體" panose="020B0604030504040204" pitchFamily="34" charset="-120"/>
                 <a:ea typeface="微軟正黑體" panose="020B0604030504040204" pitchFamily="34" charset="-120"/>
               </a:rPr>
-              <a:t>P76031292</a:t>
-            </a:r>
-            <a:r>
-              <a:rPr lang="en-US" altLang="zh-TW" sz="2000">
+              <a:t>:</a:t>
+            </a:r>
+            <a:r>
+              <a:rPr lang="zh-TW" altLang="en-US" sz="2000" dirty="0">
                 <a:solidFill>
                   <a:schemeClr val="tx1">
                     <a:alpha val="80000"/>
@@ -12686,7 +13972,7 @@
                 <a:latin typeface="微軟正黑體" panose="020B0604030504040204" pitchFamily="34" charset="-120"/>
                 <a:ea typeface="微軟正黑體" panose="020B0604030504040204" pitchFamily="34" charset="-120"/>
               </a:rPr>
-              <a:t>_lab1.</a:t>
+              <a:t> </a:t>
             </a:r>
             <a:r>
               <a:rPr lang="en-US" altLang="zh-TW" sz="2000" dirty="0">
@@ -12698,7 +13984,7 @@
                 <a:latin typeface="微軟正黑體" panose="020B0604030504040204" pitchFamily="34" charset="-120"/>
                 <a:ea typeface="微軟正黑體" panose="020B0604030504040204" pitchFamily="34" charset="-120"/>
               </a:rPr>
-              <a:t>zip</a:t>
+              <a:t>P76031292_lab1.zip</a:t>
             </a:r>
           </a:p>
           <a:p>
@@ -12841,6 +14127,32 @@
                 <a:ea typeface="微軟正黑體" panose="020B0604030504040204" pitchFamily="34" charset="-120"/>
               </a:rPr>
               <a:t>讀寫檔</a:t>
+            </a:r>
+            <a:endParaRPr lang="en-US" altLang="zh-TW" sz="2000" dirty="0">
+              <a:solidFill>
+                <a:schemeClr val="tx1">
+                  <a:alpha val="80000"/>
+                </a:schemeClr>
+              </a:solidFill>
+              <a:latin typeface="微軟正黑體" panose="020B0604030504040204" pitchFamily="34" charset="-120"/>
+              <a:ea typeface="微軟正黑體" panose="020B0604030504040204" pitchFamily="34" charset="-120"/>
+            </a:endParaRPr>
+          </a:p>
+          <a:p>
+            <a:pPr marL="457200" indent="-457200">
+              <a:buAutoNum type="arabicPeriod" startAt="4"/>
+            </a:pPr>
+            <a:r>
+              <a:rPr lang="zh-TW" altLang="en-US" sz="2000">
+                <a:solidFill>
+                  <a:schemeClr val="tx1">
+                    <a:alpha val="80000"/>
+                  </a:schemeClr>
+                </a:solidFill>
+                <a:latin typeface="微軟正黑體" panose="020B0604030504040204" pitchFamily="34" charset="-120"/>
+                <a:ea typeface="微軟正黑體" panose="020B0604030504040204" pitchFamily="34" charset="-120"/>
+              </a:rPr>
+              <a:t>若檔案繳交不完整，將會斟酌扣分</a:t>
             </a:r>
             <a:endParaRPr lang="en-US" altLang="zh-TW" sz="2000" dirty="0">
               <a:solidFill>
@@ -13036,17 +14348,9 @@
 </p:sld>
 </file>
 
-<file path=ppt/slides/slide2.xml><?xml version="1.0" encoding="utf-8"?>
+<file path=ppt/slides/slide21.xml><?xml version="1.0" encoding="utf-8"?>
 <p:sld xmlns:a="http://schemas.openxmlformats.org/drawingml/2006/main" xmlns:r="http://schemas.openxmlformats.org/officeDocument/2006/relationships" xmlns:p="http://schemas.openxmlformats.org/presentationml/2006/main">
   <p:cSld>
-    <p:bg>
-      <p:bgPr>
-        <a:solidFill>
-          <a:schemeClr val="bg1"/>
-        </a:solidFill>
-        <a:effectLst/>
-      </p:bgPr>
-    </p:bg>
     <p:spTree>
       <p:nvGrpSpPr>
         <p:cNvPr id="1" name=""/>
@@ -13063,212 +14367,92 @@
       </p:grpSpPr>
       <p:sp>
         <p:nvSpPr>
-          <p:cNvPr id="8" name="Rectangle 7">
+          <p:cNvPr id="2" name="標題 1">
             <a:extLst>
               <a:ext uri="{FF2B5EF4-FFF2-40B4-BE49-F238E27FC236}">
-                <a16:creationId xmlns:a16="http://schemas.microsoft.com/office/drawing/2014/main" id="{23962611-DFD5-4092-AAFD-559E3DFCE2C9}"/>
-              </a:ext>
-              <a:ext uri="{C183D7F6-B498-43B3-948B-1728B52AA6E4}">
-                <adec:decorative xmlns:adec="http://schemas.microsoft.com/office/drawing/2017/decorative" val="1"/>
+                <a16:creationId xmlns:a16="http://schemas.microsoft.com/office/drawing/2014/main" id="{503D1539-3531-4AA2-AECD-E98BA86B554F}"/>
               </a:ext>
             </a:extLst>
           </p:cNvPr>
           <p:cNvSpPr>
-            <a:spLocks noGrp="1" noRot="1" noChangeAspect="1" noMove="1" noResize="1" noEditPoints="1" noAdjustHandles="1" noChangeArrowheads="1" noChangeShapeType="1" noTextEdit="1"/>
+            <a:spLocks noGrp="1"/>
           </p:cNvSpPr>
           <p:nvPr>
-            <p:extLst>
-              <p:ext uri="{386F3935-93C4-4BCD-93E2-E3B085C9AB24}">
-                <p16:designElem xmlns:p16="http://schemas.microsoft.com/office/powerpoint/2015/main" val="1"/>
-              </p:ext>
-            </p:extLst>
+            <p:ph type="title"/>
           </p:nvPr>
         </p:nvSpPr>
-        <p:spPr>
-          <a:xfrm>
-            <a:off x="475488" y="0"/>
-            <a:ext cx="10910292" cy="6858000"/>
-          </a:xfrm>
-          <a:prstGeom prst="rect">
-            <a:avLst/>
-          </a:prstGeom>
-          <a:gradFill>
-            <a:gsLst>
-              <a:gs pos="0">
-                <a:schemeClr val="accent1">
-                  <a:lumMod val="90000"/>
-                </a:schemeClr>
-              </a:gs>
-              <a:gs pos="25000">
-                <a:schemeClr val="accent1">
-                  <a:lumMod val="90000"/>
-                </a:schemeClr>
-              </a:gs>
-              <a:gs pos="94000">
-                <a:schemeClr val="bg2">
-                  <a:lumMod val="25000"/>
-                </a:schemeClr>
-              </a:gs>
-              <a:gs pos="100000">
-                <a:schemeClr val="bg2">
-                  <a:lumMod val="25000"/>
-                </a:schemeClr>
-              </a:gs>
-            </a:gsLst>
-            <a:lin ang="4200000" scaled="0"/>
-          </a:gradFill>
-          <a:ln>
-            <a:noFill/>
-          </a:ln>
-        </p:spPr>
-        <p:style>
-          <a:lnRef idx="2">
-            <a:schemeClr val="accent1">
-              <a:shade val="50000"/>
-            </a:schemeClr>
-          </a:lnRef>
-          <a:fillRef idx="1">
-            <a:schemeClr val="accent1"/>
-          </a:fillRef>
-          <a:effectRef idx="0">
-            <a:schemeClr val="accent1"/>
-          </a:effectRef>
-          <a:fontRef idx="minor">
-            <a:schemeClr val="lt1"/>
-          </a:fontRef>
-        </p:style>
+        <p:spPr/>
         <p:txBody>
-          <a:bodyPr rtlCol="0" anchor="ctr"/>
+          <a:bodyPr/>
           <a:lstStyle/>
           <a:p>
-            <a:pPr algn="ctr"/>
-            <a:endParaRPr lang="en-US"/>
+            <a:r>
+              <a:rPr lang="en-US" altLang="zh-TW" dirty="0"/>
+              <a:t>reference</a:t>
+            </a:r>
+            <a:endParaRPr lang="zh-TW" altLang="en-US" dirty="0"/>
           </a:p>
         </p:txBody>
       </p:sp>
-      <p:pic>
-        <p:nvPicPr>
-          <p:cNvPr id="10" name="Picture 9">
+      <p:sp>
+        <p:nvSpPr>
+          <p:cNvPr id="3" name="內容版面配置區 2">
             <a:extLst>
               <a:ext uri="{FF2B5EF4-FFF2-40B4-BE49-F238E27FC236}">
-                <a16:creationId xmlns:a16="http://schemas.microsoft.com/office/drawing/2014/main" id="{2270F1FA-0425-408F-9861-80BF5AFB276D}"/>
-              </a:ext>
-              <a:ext uri="{C183D7F6-B498-43B3-948B-1728B52AA6E4}">
-                <adec:decorative xmlns:adec="http://schemas.microsoft.com/office/drawing/2017/decorative" val="1"/>
+                <a16:creationId xmlns:a16="http://schemas.microsoft.com/office/drawing/2014/main" id="{35ED57F5-3D8E-47F8-A96B-5558759BFD98}"/>
               </a:ext>
             </a:extLst>
           </p:cNvPr>
-          <p:cNvPicPr>
-            <a:picLocks noGrp="1" noRot="1" noChangeAspect="1" noMove="1" noResize="1" noEditPoints="1" noAdjustHandles="1" noChangeArrowheads="1" noChangeShapeType="1" noCrop="1"/>
-          </p:cNvPicPr>
-          <p:nvPr>
-            <p:extLst>
-              <p:ext uri="{386F3935-93C4-4BCD-93E2-E3B085C9AB24}">
-                <p16:designElem xmlns:p16="http://schemas.microsoft.com/office/powerpoint/2015/main" val="1"/>
-              </p:ext>
-            </p:extLst>
-          </p:nvPr>
-        </p:nvPicPr>
-        <p:blipFill>
-          <a:blip r:embed="rId2">
-            <a:extLst>
-              <a:ext uri="{28A0092B-C50C-407E-A947-70E740481C1C}">
-                <a14:useLocalDpi xmlns:a14="http://schemas.microsoft.com/office/drawing/2010/main" val="0"/>
-              </a:ext>
-            </a:extLst>
-          </a:blip>
-          <a:stretch>
-            <a:fillRect/>
-          </a:stretch>
-        </p:blipFill>
-        <p:spPr>
-          <a:xfrm>
-            <a:off x="0" y="0"/>
-            <a:ext cx="12192000" cy="6858000"/>
-          </a:xfrm>
-          <a:prstGeom prst="rect">
-            <a:avLst/>
-          </a:prstGeom>
-        </p:spPr>
-      </p:pic>
-      <p:sp>
-        <p:nvSpPr>
-          <p:cNvPr id="2" name="標題 1"/>
           <p:cNvSpPr>
             <a:spLocks noGrp="1"/>
           </p:cNvSpPr>
           <p:nvPr>
-            <p:ph type="ctrTitle"/>
+            <p:ph idx="1"/>
           </p:nvPr>
         </p:nvSpPr>
-        <p:spPr>
-          <a:xfrm>
-            <a:off x="3045368" y="2043663"/>
-            <a:ext cx="6105194" cy="2031055"/>
-          </a:xfrm>
-        </p:spPr>
+        <p:spPr/>
         <p:txBody>
-          <a:bodyPr>
-            <a:normAutofit/>
-          </a:bodyPr>
+          <a:bodyPr/>
           <a:lstStyle/>
           <a:p>
             <a:r>
-              <a:rPr lang="en-US" altLang="zh-TW">
-                <a:solidFill>
-                  <a:srgbClr val="FFFFFF"/>
-                </a:solidFill>
-                <a:latin typeface="Times New Roman" panose="02020603050405020304" pitchFamily="18" charset="0"/>
-                <a:cs typeface="Times New Roman" panose="02020603050405020304" pitchFamily="18" charset="0"/>
+              <a:rPr lang="en-US" altLang="zh-TW" dirty="0">
+                <a:hlinkClick r:id="rId2"/>
               </a:rPr>
-              <a:t>Socket programming</a:t>
-            </a:r>
-            <a:endParaRPr lang="zh-TW" altLang="en-US">
-              <a:solidFill>
-                <a:srgbClr val="FFFFFF"/>
-              </a:solidFill>
-              <a:latin typeface="Times New Roman" panose="02020603050405020304" pitchFamily="18" charset="0"/>
-              <a:cs typeface="Times New Roman" panose="02020603050405020304" pitchFamily="18" charset="0"/>
-            </a:endParaRPr>
-          </a:p>
-        </p:txBody>
-      </p:sp>
-      <p:sp>
-        <p:nvSpPr>
-          <p:cNvPr id="3" name="副標題 2"/>
-          <p:cNvSpPr>
-            <a:spLocks noGrp="1"/>
-          </p:cNvSpPr>
-          <p:nvPr>
-            <p:ph type="subTitle" idx="1"/>
-          </p:nvPr>
-        </p:nvSpPr>
-        <p:spPr>
-          <a:xfrm>
-            <a:off x="3045368" y="4074718"/>
-            <a:ext cx="6105194" cy="682079"/>
-          </a:xfrm>
-        </p:spPr>
-        <p:txBody>
-          <a:bodyPr>
-            <a:normAutofit/>
-          </a:bodyPr>
-          <a:lstStyle/>
-          <a:p>
-            <a:endParaRPr lang="zh-TW" altLang="en-US">
-              <a:solidFill>
-                <a:srgbClr val="FFFFFF"/>
-              </a:solidFill>
-              <a:latin typeface="Times New Roman" panose="02020603050405020304" pitchFamily="18" charset="0"/>
-              <a:cs typeface="Times New Roman" panose="02020603050405020304" pitchFamily="18" charset="0"/>
-            </a:endParaRPr>
+              <a:t>https://pubs.opengroup.org/onlinepubs/7908799/xns/socket.html</a:t>
+            </a:r>
+            <a:endParaRPr lang="en-US" altLang="zh-TW" dirty="0"/>
+          </a:p>
+          <a:p>
+            <a:r>
+              <a:rPr lang="en-US" altLang="zh-TW" sz="3200" b="1" dirty="0">
+                <a:hlinkClick r:id="rId3"/>
+              </a:rPr>
+              <a:t>https://www.itread01.com/p/1380962.html</a:t>
+            </a:r>
+            <a:endParaRPr lang="en-US" altLang="zh-TW" sz="3200" b="1" dirty="0"/>
+          </a:p>
+          <a:p>
+            <a:r>
+              <a:rPr lang="en-US" altLang="zh-TW" dirty="0">
+                <a:hlinkClick r:id="rId4"/>
+              </a:rPr>
+              <a:t>https://www.csd.uoc.gr/~hy556/material/tutorials/cs556-3rd-tutorial.pdf</a:t>
+            </a:r>
+            <a:endParaRPr lang="en-US" altLang="zh-TW" dirty="0"/>
+          </a:p>
+          <a:p>
+            <a:endParaRPr lang="en-US" altLang="zh-TW" dirty="0"/>
+          </a:p>
+          <a:p>
+            <a:endParaRPr lang="zh-TW" altLang="en-US" dirty="0"/>
           </a:p>
         </p:txBody>
       </p:sp>
     </p:spTree>
     <p:extLst>
       <p:ext uri="{BB962C8B-B14F-4D97-AF65-F5344CB8AC3E}">
-        <p14:creationId xmlns:p14="http://schemas.microsoft.com/office/powerpoint/2010/main" val="3274544832"/>
+        <p14:creationId xmlns:p14="http://schemas.microsoft.com/office/powerpoint/2010/main" val="170192318"/>
       </p:ext>
     </p:extLst>
   </p:cSld>
@@ -13457,14 +14641,14 @@
           <a:p>
             <a:pPr algn="ctr"/>
             <a:r>
-              <a:rPr lang="en-US" altLang="zh-TW" sz="4000">
+              <a:rPr lang="en-US" altLang="zh-TW" sz="4000" dirty="0">
                 <a:solidFill>
                   <a:srgbClr val="FFFFFF"/>
                 </a:solidFill>
               </a:rPr>
-              <a:t>Socket</a:t>
-            </a:r>
-            <a:endParaRPr lang="zh-TW" altLang="en-US" sz="4000">
+              <a:t>Client-Server communication</a:t>
+            </a:r>
+            <a:endParaRPr lang="zh-TW" altLang="en-US" sz="4000" dirty="0">
               <a:solidFill>
                 <a:srgbClr val="FFFFFF"/>
               </a:solidFill>
@@ -13490,31 +14674,81 @@
         </p:spPr>
         <p:txBody>
           <a:bodyPr>
-            <a:normAutofit/>
+            <a:normAutofit lnSpcReduction="10000"/>
           </a:bodyPr>
           <a:lstStyle/>
           <a:p>
             <a:r>
-              <a:rPr lang="en-US" altLang="zh-TW" sz="2000">
+              <a:rPr lang="en-US" altLang="zh-TW" dirty="0">
                 <a:solidFill>
                   <a:srgbClr val="000000"/>
                 </a:solidFill>
               </a:rPr>
-              <a:t>These two process should be different computer</a:t>
-            </a:r>
-          </a:p>
-          <a:p>
-            <a:r>
-              <a:rPr lang="en-US" altLang="zh-TW" sz="2000">
+              <a:t>Server</a:t>
+            </a:r>
+          </a:p>
+          <a:p>
+            <a:pPr lvl="1"/>
+            <a:r>
+              <a:rPr lang="en-US" altLang="zh-TW" dirty="0"/>
+              <a:t>Passively waits for and responds to clients</a:t>
+            </a:r>
+          </a:p>
+          <a:p>
+            <a:pPr lvl="1"/>
+            <a:r>
+              <a:rPr lang="en-US" altLang="zh-TW" dirty="0"/>
+              <a:t>passive socket</a:t>
+            </a:r>
+          </a:p>
+          <a:p>
+            <a:r>
+              <a:rPr lang="en-US" altLang="zh-TW" dirty="0">
                 <a:solidFill>
                   <a:srgbClr val="000000"/>
                 </a:solidFill>
               </a:rPr>
-              <a:t>Using IP + port + protocol to describe a communication</a:t>
-            </a:r>
-          </a:p>
-          <a:p>
-            <a:endParaRPr lang="zh-TW" altLang="en-US" sz="2000">
+              <a:t>Client</a:t>
+            </a:r>
+          </a:p>
+          <a:p>
+            <a:pPr lvl="1"/>
+            <a:r>
+              <a:rPr lang="en-US" altLang="zh-TW" dirty="0"/>
+              <a:t>initiates the communication</a:t>
+            </a:r>
+            <a:endParaRPr lang="en-US" altLang="zh-TW" dirty="0">
+              <a:solidFill>
+                <a:srgbClr val="000000"/>
+              </a:solidFill>
+            </a:endParaRPr>
+          </a:p>
+          <a:p>
+            <a:pPr lvl="1"/>
+            <a:r>
+              <a:rPr lang="en-US" altLang="zh-TW" dirty="0"/>
+              <a:t>must know the address and the port of the server</a:t>
+            </a:r>
+            <a:endParaRPr lang="en-US" altLang="zh-TW" dirty="0">
+              <a:solidFill>
+                <a:srgbClr val="000000"/>
+              </a:solidFill>
+            </a:endParaRPr>
+          </a:p>
+          <a:p>
+            <a:pPr lvl="1"/>
+            <a:r>
+              <a:rPr lang="en-US" altLang="zh-TW" dirty="0"/>
+              <a:t>active socket</a:t>
+            </a:r>
+            <a:endParaRPr lang="en-US" altLang="zh-TW" dirty="0">
+              <a:solidFill>
+                <a:srgbClr val="000000"/>
+              </a:solidFill>
+            </a:endParaRPr>
+          </a:p>
+          <a:p>
+            <a:endParaRPr lang="zh-TW" altLang="en-US" sz="2000" dirty="0">
               <a:solidFill>
                 <a:srgbClr val="000000"/>
               </a:solidFill>
@@ -13536,6 +14770,183 @@
 </file>
 
 <file path=ppt/slides/slide4.xml><?xml version="1.0" encoding="utf-8"?>
+<p:sld xmlns:a="http://schemas.openxmlformats.org/drawingml/2006/main" xmlns:r="http://schemas.openxmlformats.org/officeDocument/2006/relationships" xmlns:p="http://schemas.openxmlformats.org/presentationml/2006/main">
+  <p:cSld>
+    <p:spTree>
+      <p:nvGrpSpPr>
+        <p:cNvPr id="1" name=""/>
+        <p:cNvGrpSpPr/>
+        <p:nvPr/>
+      </p:nvGrpSpPr>
+      <p:grpSpPr>
+        <a:xfrm>
+          <a:off x="0" y="0"/>
+          <a:ext cx="0" cy="0"/>
+          <a:chOff x="0" y="0"/>
+          <a:chExt cx="0" cy="0"/>
+        </a:xfrm>
+      </p:grpSpPr>
+      <p:sp>
+        <p:nvSpPr>
+          <p:cNvPr id="2" name="標題 1">
+            <a:extLst>
+              <a:ext uri="{FF2B5EF4-FFF2-40B4-BE49-F238E27FC236}">
+                <a16:creationId xmlns:a16="http://schemas.microsoft.com/office/drawing/2014/main" id="{37955F43-AE94-44B4-9C4B-C66C764D24A6}"/>
+              </a:ext>
+            </a:extLst>
+          </p:cNvPr>
+          <p:cNvSpPr>
+            <a:spLocks noGrp="1"/>
+          </p:cNvSpPr>
+          <p:nvPr>
+            <p:ph type="title"/>
+          </p:nvPr>
+        </p:nvSpPr>
+        <p:spPr/>
+        <p:txBody>
+          <a:bodyPr/>
+          <a:lstStyle/>
+          <a:p>
+            <a:r>
+              <a:rPr lang="en-US" altLang="zh-TW" dirty="0"/>
+              <a:t>Socket in OSI 7 Layers</a:t>
+            </a:r>
+            <a:endParaRPr lang="zh-TW" altLang="en-US" dirty="0"/>
+          </a:p>
+        </p:txBody>
+      </p:sp>
+      <p:pic>
+        <p:nvPicPr>
+          <p:cNvPr id="4" name="圖片 3">
+            <a:extLst>
+              <a:ext uri="{FF2B5EF4-FFF2-40B4-BE49-F238E27FC236}">
+                <a16:creationId xmlns:a16="http://schemas.microsoft.com/office/drawing/2014/main" id="{3DFDD3DF-DDDA-4877-A20F-8BF3B78E13AC}"/>
+              </a:ext>
+            </a:extLst>
+          </p:cNvPr>
+          <p:cNvPicPr>
+            <a:picLocks noChangeAspect="1"/>
+          </p:cNvPicPr>
+          <p:nvPr/>
+        </p:nvPicPr>
+        <p:blipFill>
+          <a:blip r:embed="rId2"/>
+          <a:stretch>
+            <a:fillRect/>
+          </a:stretch>
+        </p:blipFill>
+        <p:spPr>
+          <a:xfrm>
+            <a:off x="2928235" y="1540499"/>
+            <a:ext cx="5357144" cy="5115208"/>
+          </a:xfrm>
+          <a:prstGeom prst="rect">
+            <a:avLst/>
+          </a:prstGeom>
+        </p:spPr>
+      </p:pic>
+      <p:sp>
+        <p:nvSpPr>
+          <p:cNvPr id="5" name="圓角矩形 2">
+            <a:extLst>
+              <a:ext uri="{FF2B5EF4-FFF2-40B4-BE49-F238E27FC236}">
+                <a16:creationId xmlns:a16="http://schemas.microsoft.com/office/drawing/2014/main" id="{07C7538A-F821-4BC8-8977-FEC39BA6B7F2}"/>
+              </a:ext>
+            </a:extLst>
+          </p:cNvPr>
+          <p:cNvSpPr/>
+          <p:nvPr/>
+        </p:nvSpPr>
+        <p:spPr>
+          <a:xfrm>
+            <a:off x="3247693" y="3407955"/>
+            <a:ext cx="4936582" cy="89313"/>
+          </a:xfrm>
+          <a:prstGeom prst="roundRect">
+            <a:avLst/>
+          </a:prstGeom>
+          <a:noFill/>
+          <a:ln w="38100">
+            <a:solidFill>
+              <a:schemeClr val="accent1"/>
+            </a:solidFill>
+          </a:ln>
+        </p:spPr>
+        <p:style>
+          <a:lnRef idx="2">
+            <a:schemeClr val="accent1">
+              <a:shade val="50000"/>
+            </a:schemeClr>
+          </a:lnRef>
+          <a:fillRef idx="1">
+            <a:schemeClr val="accent1"/>
+          </a:fillRef>
+          <a:effectRef idx="0">
+            <a:schemeClr val="accent1"/>
+          </a:effectRef>
+          <a:fontRef idx="minor">
+            <a:schemeClr val="lt1"/>
+          </a:fontRef>
+        </p:style>
+        <p:txBody>
+          <a:bodyPr rtlCol="0" anchor="ctr"/>
+          <a:lstStyle/>
+          <a:p>
+            <a:pPr algn="ctr"/>
+            <a:endParaRPr lang="zh-TW" altLang="en-US"/>
+          </a:p>
+        </p:txBody>
+      </p:sp>
+      <p:sp>
+        <p:nvSpPr>
+          <p:cNvPr id="6" name="文字方塊 5">
+            <a:extLst>
+              <a:ext uri="{FF2B5EF4-FFF2-40B4-BE49-F238E27FC236}">
+                <a16:creationId xmlns:a16="http://schemas.microsoft.com/office/drawing/2014/main" id="{82EC26A5-5CC7-441E-AE15-2CF1729E8C25}"/>
+              </a:ext>
+            </a:extLst>
+          </p:cNvPr>
+          <p:cNvSpPr txBox="1"/>
+          <p:nvPr/>
+        </p:nvSpPr>
+        <p:spPr>
+          <a:xfrm>
+            <a:off x="8184275" y="3016194"/>
+            <a:ext cx="1629357" cy="769441"/>
+          </a:xfrm>
+          <a:prstGeom prst="rect">
+            <a:avLst/>
+          </a:prstGeom>
+          <a:noFill/>
+        </p:spPr>
+        <p:txBody>
+          <a:bodyPr wrap="none" rtlCol="0">
+            <a:spAutoFit/>
+          </a:bodyPr>
+          <a:lstStyle/>
+          <a:p>
+            <a:r>
+              <a:rPr lang="en-US" altLang="zh-TW" sz="4400" dirty="0"/>
+              <a:t>socket</a:t>
+            </a:r>
+            <a:endParaRPr lang="zh-TW" altLang="en-US" sz="4400" dirty="0"/>
+          </a:p>
+        </p:txBody>
+      </p:sp>
+    </p:spTree>
+    <p:extLst>
+      <p:ext uri="{BB962C8B-B14F-4D97-AF65-F5344CB8AC3E}">
+        <p14:creationId xmlns:p14="http://schemas.microsoft.com/office/powerpoint/2010/main" val="2276207368"/>
+      </p:ext>
+    </p:extLst>
+  </p:cSld>
+  <p:clrMapOvr>
+    <a:masterClrMapping/>
+  </p:clrMapOvr>
+</p:sld>
+</file>
+
+<file path=ppt/slides/slide5.xml><?xml version="1.0" encoding="utf-8"?>
 <p:sld xmlns:a="http://schemas.openxmlformats.org/drawingml/2006/main" xmlns:r="http://schemas.openxmlformats.org/officeDocument/2006/relationships" xmlns:p="http://schemas.openxmlformats.org/presentationml/2006/main">
   <p:cSld>
     <p:bg>
@@ -13855,7 +15266,7 @@
 </p:sld>
 </file>
 
-<file path=ppt/slides/slide5.xml><?xml version="1.0" encoding="utf-8"?>
+<file path=ppt/slides/slide6.xml><?xml version="1.0" encoding="utf-8"?>
 <p:sld xmlns:a="http://schemas.openxmlformats.org/drawingml/2006/main" xmlns:r="http://schemas.openxmlformats.org/officeDocument/2006/relationships" xmlns:p="http://schemas.openxmlformats.org/presentationml/2006/main">
   <p:cSld>
     <p:spTree>
@@ -13915,14 +15326,20 @@
         </p:nvSpPr>
         <p:spPr>
           <a:xfrm>
-            <a:off x="838200" y="1825625"/>
-            <a:ext cx="4461588" cy="3642114"/>
+            <a:off x="838200" y="1592991"/>
+            <a:ext cx="4461588" cy="5032375"/>
           </a:xfrm>
         </p:spPr>
         <p:txBody>
-          <a:bodyPr/>
+          <a:bodyPr>
+            <a:normAutofit fontScale="92500" lnSpcReduction="20000"/>
+          </a:bodyPr>
           <a:lstStyle/>
           <a:p>
+            <a:pPr marL="514350" indent="-514350">
+              <a:buFont typeface="+mj-lt"/>
+              <a:buAutoNum type="arabicPeriod"/>
+            </a:pPr>
             <a:r>
               <a:rPr lang="en-US" altLang="zh-TW" dirty="0"/>
               <a:t>Establish</a:t>
@@ -13937,6 +15354,17 @@
             </a:r>
           </a:p>
           <a:p>
+            <a:pPr marL="514350" indent="-514350">
+              <a:buFont typeface="+mj-lt"/>
+              <a:buAutoNum type="arabicPeriod"/>
+            </a:pPr>
+            <a:endParaRPr lang="en-US" altLang="zh-TW" dirty="0"/>
+          </a:p>
+          <a:p>
+            <a:pPr marL="514350" indent="-514350">
+              <a:buFont typeface="+mj-lt"/>
+              <a:buAutoNum type="arabicPeriod"/>
+            </a:pPr>
             <a:r>
               <a:rPr lang="en-US" altLang="zh-TW" dirty="0"/>
               <a:t>Bind address</a:t>
@@ -13959,18 +15387,51 @@
             </a:r>
           </a:p>
           <a:p>
+            <a:pPr marL="514350" indent="-514350">
+              <a:buFont typeface="+mj-lt"/>
+              <a:buAutoNum type="arabicPeriod"/>
+            </a:pPr>
+            <a:endParaRPr lang="en-US" altLang="zh-TW" dirty="0"/>
+          </a:p>
+          <a:p>
+            <a:pPr marL="514350" indent="-514350">
+              <a:buFont typeface="+mj-lt"/>
+              <a:buAutoNum type="arabicPeriod"/>
+            </a:pPr>
             <a:r>
               <a:rPr lang="en-US" altLang="zh-TW" dirty="0"/>
               <a:t>Listen for request</a:t>
             </a:r>
           </a:p>
           <a:p>
+            <a:pPr marL="514350" indent="-514350">
+              <a:buFont typeface="+mj-lt"/>
+              <a:buAutoNum type="arabicPeriod"/>
+            </a:pPr>
+            <a:endParaRPr lang="en-US" altLang="zh-TW" dirty="0"/>
+          </a:p>
+          <a:p>
+            <a:pPr marL="514350" indent="-514350">
+              <a:buFont typeface="+mj-lt"/>
+              <a:buAutoNum type="arabicPeriod"/>
+            </a:pPr>
             <a:r>
               <a:rPr lang="en-US" altLang="zh-TW" dirty="0"/>
               <a:t>Accept request from client</a:t>
             </a:r>
           </a:p>
           <a:p>
+            <a:pPr marL="514350" indent="-514350">
+              <a:buFont typeface="+mj-lt"/>
+              <a:buAutoNum type="arabicPeriod"/>
+            </a:pPr>
+            <a:endParaRPr lang="en-US" altLang="zh-TW" dirty="0"/>
+          </a:p>
+          <a:p>
+            <a:pPr marL="514350" indent="-514350">
+              <a:buFont typeface="+mj-lt"/>
+              <a:buAutoNum type="arabicPeriod"/>
+            </a:pPr>
             <a:r>
               <a:rPr lang="en-US" altLang="zh-TW" dirty="0"/>
               <a:t>Read</a:t>
@@ -13985,6 +15446,17 @@
             </a:r>
           </a:p>
           <a:p>
+            <a:pPr marL="514350" indent="-514350">
+              <a:buFont typeface="+mj-lt"/>
+              <a:buAutoNum type="arabicPeriod"/>
+            </a:pPr>
+            <a:endParaRPr lang="en-US" altLang="zh-TW" dirty="0"/>
+          </a:p>
+          <a:p>
+            <a:pPr marL="514350" indent="-514350">
+              <a:buFont typeface="+mj-lt"/>
+              <a:buAutoNum type="arabicPeriod"/>
+            </a:pPr>
             <a:r>
               <a:rPr lang="en-US" altLang="zh-TW" dirty="0"/>
               <a:t>Write</a:t>
@@ -13999,6 +15471,17 @@
             </a:r>
           </a:p>
           <a:p>
+            <a:pPr marL="514350" indent="-514350">
+              <a:buFont typeface="+mj-lt"/>
+              <a:buAutoNum type="arabicPeriod"/>
+            </a:pPr>
+            <a:endParaRPr lang="en-US" altLang="zh-TW" dirty="0"/>
+          </a:p>
+          <a:p>
+            <a:pPr marL="514350" indent="-514350">
+              <a:buFont typeface="+mj-lt"/>
+              <a:buAutoNum type="arabicPeriod"/>
+            </a:pPr>
             <a:r>
               <a:rPr lang="en-US" altLang="zh-TW" dirty="0"/>
               <a:t>Close</a:t>
@@ -14047,7 +15530,7 @@
           <a:noFill/>
           <a:extLst>
             <a:ext uri="{909E8E84-426E-40dd-AFC4-6F175D3DCCD1}">
-              <a14:hiddenFill xmlns:a14="http://schemas.microsoft.com/office/drawing/2010/main" xmlns="">
+              <a14:hiddenFill xmlns="" xmlns:a14="http://schemas.microsoft.com/office/drawing/2010/main">
                 <a:solidFill>
                   <a:srgbClr val="FFFFFF"/>
                 </a:solidFill>
@@ -14060,402 +15543,6 @@
     <p:extLst>
       <p:ext uri="{BB962C8B-B14F-4D97-AF65-F5344CB8AC3E}">
         <p14:creationId xmlns:p14="http://schemas.microsoft.com/office/powerpoint/2010/main" val="92168545"/>
-      </p:ext>
-    </p:extLst>
-  </p:cSld>
-  <p:clrMapOvr>
-    <a:masterClrMapping/>
-  </p:clrMapOvr>
-</p:sld>
-</file>
-
-<file path=ppt/slides/slide6.xml><?xml version="1.0" encoding="utf-8"?>
-<p:sld xmlns:a="http://schemas.openxmlformats.org/drawingml/2006/main" xmlns:r="http://schemas.openxmlformats.org/officeDocument/2006/relationships" xmlns:p="http://schemas.openxmlformats.org/presentationml/2006/main">
-  <p:cSld>
-    <p:spTree>
-      <p:nvGrpSpPr>
-        <p:cNvPr id="1" name=""/>
-        <p:cNvGrpSpPr/>
-        <p:nvPr/>
-      </p:nvGrpSpPr>
-      <p:grpSpPr>
-        <a:xfrm>
-          <a:off x="0" y="0"/>
-          <a:ext cx="0" cy="0"/>
-          <a:chOff x="0" y="0"/>
-          <a:chExt cx="0" cy="0"/>
-        </a:xfrm>
-      </p:grpSpPr>
-      <p:sp>
-        <p:nvSpPr>
-          <p:cNvPr id="2" name="標題 1"/>
-          <p:cNvSpPr>
-            <a:spLocks noGrp="1"/>
-          </p:cNvSpPr>
-          <p:nvPr>
-            <p:ph type="title"/>
-          </p:nvPr>
-        </p:nvSpPr>
-        <p:spPr/>
-        <p:txBody>
-          <a:bodyPr/>
-          <a:lstStyle/>
-          <a:p>
-            <a:r>
-              <a:rPr kumimoji="1" lang="en-US" altLang="zh-TW" dirty="0">
-                <a:latin typeface="Times New Roman" panose="02020603050405020304" pitchFamily="18" charset="0"/>
-                <a:cs typeface="Times New Roman" panose="02020603050405020304" pitchFamily="18" charset="0"/>
-              </a:rPr>
-              <a:t>Using</a:t>
-            </a:r>
-            <a:r>
-              <a:rPr kumimoji="1" lang="zh-TW" altLang="en-US" dirty="0">
-                <a:latin typeface="Times New Roman" panose="02020603050405020304" pitchFamily="18" charset="0"/>
-                <a:cs typeface="Times New Roman" panose="02020603050405020304" pitchFamily="18" charset="0"/>
-              </a:rPr>
-              <a:t> </a:t>
-            </a:r>
-            <a:r>
-              <a:rPr kumimoji="1" lang="en-US" altLang="zh-TW" dirty="0">
-                <a:latin typeface="Times New Roman" panose="02020603050405020304" pitchFamily="18" charset="0"/>
-                <a:cs typeface="Times New Roman" panose="02020603050405020304" pitchFamily="18" charset="0"/>
-              </a:rPr>
-              <a:t>System Call </a:t>
-            </a:r>
-            <a:endParaRPr kumimoji="1" lang="zh-TW" altLang="en-US" dirty="0">
-              <a:latin typeface="Times New Roman" panose="02020603050405020304" pitchFamily="18" charset="0"/>
-              <a:cs typeface="Times New Roman" panose="02020603050405020304" pitchFamily="18" charset="0"/>
-            </a:endParaRPr>
-          </a:p>
-        </p:txBody>
-      </p:sp>
-      <p:sp>
-        <p:nvSpPr>
-          <p:cNvPr id="3" name="內容版面配置區 2"/>
-          <p:cNvSpPr>
-            <a:spLocks noGrp="1"/>
-          </p:cNvSpPr>
-          <p:nvPr>
-            <p:ph idx="1"/>
-          </p:nvPr>
-        </p:nvSpPr>
-        <p:spPr/>
-        <p:txBody>
-          <a:bodyPr>
-            <a:normAutofit/>
-          </a:bodyPr>
-          <a:lstStyle/>
-          <a:p>
-            <a:r>
-              <a:rPr kumimoji="1" lang="en-US" altLang="zh-TW" dirty="0">
-                <a:latin typeface="Times New Roman" panose="02020603050405020304" pitchFamily="18" charset="0"/>
-                <a:cs typeface="Times New Roman" panose="02020603050405020304" pitchFamily="18" charset="0"/>
-              </a:rPr>
-              <a:t>socket(AF_INET, SOCK_STREAM, 0)</a:t>
-            </a:r>
-          </a:p>
-          <a:p>
-            <a:pPr lvl="1"/>
-            <a:r>
-              <a:rPr kumimoji="1" lang="en-US" altLang="zh-TW" dirty="0">
-                <a:latin typeface="Times New Roman" panose="02020603050405020304" pitchFamily="18" charset="0"/>
-                <a:cs typeface="Times New Roman" panose="02020603050405020304" pitchFamily="18" charset="0"/>
-              </a:rPr>
-              <a:t>AF_INET : address family, ipv4</a:t>
-            </a:r>
-          </a:p>
-          <a:p>
-            <a:pPr lvl="1"/>
-            <a:r>
-              <a:rPr kumimoji="1" lang="en-US" altLang="zh-TW" dirty="0">
-                <a:latin typeface="Times New Roman" panose="02020603050405020304" pitchFamily="18" charset="0"/>
-                <a:cs typeface="Times New Roman" panose="02020603050405020304" pitchFamily="18" charset="0"/>
-              </a:rPr>
-              <a:t>SOCK_STREAM : connection type, for</a:t>
-            </a:r>
-            <a:r>
-              <a:rPr kumimoji="1" lang="zh-TW" altLang="en-US" dirty="0">
-                <a:latin typeface="Times New Roman" panose="02020603050405020304" pitchFamily="18" charset="0"/>
-                <a:cs typeface="Times New Roman" panose="02020603050405020304" pitchFamily="18" charset="0"/>
-              </a:rPr>
-              <a:t> </a:t>
-            </a:r>
-            <a:r>
-              <a:rPr kumimoji="1" lang="en-US" altLang="zh-TW" dirty="0">
-                <a:latin typeface="Times New Roman" panose="02020603050405020304" pitchFamily="18" charset="0"/>
-                <a:cs typeface="Times New Roman" panose="02020603050405020304" pitchFamily="18" charset="0"/>
-              </a:rPr>
-              <a:t>TCP(SOCK_DGRAM</a:t>
-            </a:r>
-            <a:r>
-              <a:rPr kumimoji="1" lang="zh-TW" altLang="en-US" dirty="0">
-                <a:latin typeface="Times New Roman" panose="02020603050405020304" pitchFamily="18" charset="0"/>
-                <a:cs typeface="Times New Roman" panose="02020603050405020304" pitchFamily="18" charset="0"/>
-              </a:rPr>
-              <a:t> </a:t>
-            </a:r>
-            <a:r>
-              <a:rPr kumimoji="1" lang="en-US" altLang="zh-TW" dirty="0">
-                <a:latin typeface="Times New Roman" panose="02020603050405020304" pitchFamily="18" charset="0"/>
-                <a:cs typeface="Times New Roman" panose="02020603050405020304" pitchFamily="18" charset="0"/>
-              </a:rPr>
-              <a:t>for</a:t>
-            </a:r>
-            <a:r>
-              <a:rPr kumimoji="1" lang="zh-TW" altLang="en-US" dirty="0">
-                <a:latin typeface="Times New Roman" panose="02020603050405020304" pitchFamily="18" charset="0"/>
-                <a:cs typeface="Times New Roman" panose="02020603050405020304" pitchFamily="18" charset="0"/>
-              </a:rPr>
-              <a:t> </a:t>
-            </a:r>
-            <a:r>
-              <a:rPr kumimoji="1" lang="en-US" altLang="zh-TW" dirty="0">
-                <a:latin typeface="Times New Roman" panose="02020603050405020304" pitchFamily="18" charset="0"/>
-                <a:cs typeface="Times New Roman" panose="02020603050405020304" pitchFamily="18" charset="0"/>
-              </a:rPr>
-              <a:t>UDP)</a:t>
-            </a:r>
-          </a:p>
-          <a:p>
-            <a:pPr lvl="1"/>
-            <a:r>
-              <a:rPr kumimoji="1" lang="en-US" altLang="zh-TW" dirty="0">
-                <a:latin typeface="Times New Roman" panose="02020603050405020304" pitchFamily="18" charset="0"/>
-                <a:cs typeface="Times New Roman" panose="02020603050405020304" pitchFamily="18" charset="0"/>
-              </a:rPr>
-              <a:t>Return type : </a:t>
-            </a:r>
-            <a:r>
-              <a:rPr kumimoji="1" lang="en-US" altLang="zh-TW" dirty="0" err="1">
-                <a:latin typeface="Times New Roman" panose="02020603050405020304" pitchFamily="18" charset="0"/>
-                <a:cs typeface="Times New Roman" panose="02020603050405020304" pitchFamily="18" charset="0"/>
-              </a:rPr>
-              <a:t>int</a:t>
-            </a:r>
-            <a:endParaRPr kumimoji="1" lang="en-US" altLang="zh-TW" dirty="0">
-              <a:latin typeface="Times New Roman" panose="02020603050405020304" pitchFamily="18" charset="0"/>
-              <a:cs typeface="Times New Roman" panose="02020603050405020304" pitchFamily="18" charset="0"/>
-            </a:endParaRPr>
-          </a:p>
-          <a:p>
-            <a:pPr marL="457200" lvl="1" indent="0">
-              <a:buNone/>
-            </a:pPr>
-            <a:endParaRPr kumimoji="1" lang="en-US" altLang="zh-TW" dirty="0">
-              <a:latin typeface="Times New Roman" panose="02020603050405020304" pitchFamily="18" charset="0"/>
-              <a:cs typeface="Times New Roman" panose="02020603050405020304" pitchFamily="18" charset="0"/>
-            </a:endParaRPr>
-          </a:p>
-          <a:p>
-            <a:r>
-              <a:rPr kumimoji="1" lang="en-US" altLang="zh-TW" dirty="0">
-                <a:latin typeface="Times New Roman" panose="02020603050405020304" pitchFamily="18" charset="0"/>
-                <a:cs typeface="Times New Roman" panose="02020603050405020304" pitchFamily="18" charset="0"/>
-              </a:rPr>
-              <a:t>bind(</a:t>
-            </a:r>
-            <a:r>
-              <a:rPr kumimoji="1" lang="en-US" altLang="zh-TW" dirty="0" err="1">
-                <a:latin typeface="Times New Roman" panose="02020603050405020304" pitchFamily="18" charset="0"/>
-                <a:cs typeface="Times New Roman" panose="02020603050405020304" pitchFamily="18" charset="0"/>
-              </a:rPr>
-              <a:t>sockfd</a:t>
-            </a:r>
-            <a:r>
-              <a:rPr kumimoji="1" lang="en-US" altLang="zh-TW" dirty="0">
-                <a:latin typeface="Times New Roman" panose="02020603050405020304" pitchFamily="18" charset="0"/>
-                <a:cs typeface="Times New Roman" panose="02020603050405020304" pitchFamily="18" charset="0"/>
-              </a:rPr>
-              <a:t>,  (</a:t>
-            </a:r>
-            <a:r>
-              <a:rPr kumimoji="1" lang="en-US" altLang="zh-TW" dirty="0" err="1">
-                <a:latin typeface="Times New Roman" panose="02020603050405020304" pitchFamily="18" charset="0"/>
-                <a:cs typeface="Times New Roman" panose="02020603050405020304" pitchFamily="18" charset="0"/>
-              </a:rPr>
-              <a:t>struct</a:t>
-            </a:r>
-            <a:r>
-              <a:rPr kumimoji="1" lang="en-US" altLang="zh-TW" dirty="0">
-                <a:latin typeface="Times New Roman" panose="02020603050405020304" pitchFamily="18" charset="0"/>
-                <a:cs typeface="Times New Roman" panose="02020603050405020304" pitchFamily="18" charset="0"/>
-              </a:rPr>
-              <a:t> </a:t>
-            </a:r>
-            <a:r>
-              <a:rPr kumimoji="1" lang="en-US" altLang="zh-TW" dirty="0" err="1">
-                <a:latin typeface="Times New Roman" panose="02020603050405020304" pitchFamily="18" charset="0"/>
-                <a:cs typeface="Times New Roman" panose="02020603050405020304" pitchFamily="18" charset="0"/>
-              </a:rPr>
-              <a:t>sockaddr</a:t>
-            </a:r>
-            <a:r>
-              <a:rPr kumimoji="1" lang="en-US" altLang="zh-TW" dirty="0">
-                <a:latin typeface="Times New Roman" panose="02020603050405020304" pitchFamily="18" charset="0"/>
-                <a:cs typeface="Times New Roman" panose="02020603050405020304" pitchFamily="18" charset="0"/>
-              </a:rPr>
-              <a:t>*)&amp; </a:t>
-            </a:r>
-            <a:r>
-              <a:rPr kumimoji="1" lang="en-US" altLang="zh-TW" dirty="0" err="1">
-                <a:latin typeface="Times New Roman" panose="02020603050405020304" pitchFamily="18" charset="0"/>
-                <a:cs typeface="Times New Roman" panose="02020603050405020304" pitchFamily="18" charset="0"/>
-              </a:rPr>
-              <a:t>server_addr</a:t>
-            </a:r>
-            <a:r>
-              <a:rPr kumimoji="1" lang="en-US" altLang="zh-TW" dirty="0">
-                <a:latin typeface="Times New Roman" panose="02020603050405020304" pitchFamily="18" charset="0"/>
-                <a:cs typeface="Times New Roman" panose="02020603050405020304" pitchFamily="18" charset="0"/>
-              </a:rPr>
-              <a:t>, sizeof(</a:t>
-            </a:r>
-            <a:r>
-              <a:rPr kumimoji="1" lang="en-US" altLang="zh-TW" dirty="0" err="1">
-                <a:latin typeface="Times New Roman" panose="02020603050405020304" pitchFamily="18" charset="0"/>
-                <a:cs typeface="Times New Roman" panose="02020603050405020304" pitchFamily="18" charset="0"/>
-              </a:rPr>
-              <a:t>server_addr</a:t>
-            </a:r>
-            <a:r>
-              <a:rPr kumimoji="1" lang="en-US" altLang="zh-TW" dirty="0">
-                <a:latin typeface="Times New Roman" panose="02020603050405020304" pitchFamily="18" charset="0"/>
-                <a:cs typeface="Times New Roman" panose="02020603050405020304" pitchFamily="18" charset="0"/>
-              </a:rPr>
-              <a:t>))</a:t>
-            </a:r>
-          </a:p>
-          <a:p>
-            <a:pPr lvl="1"/>
-            <a:r>
-              <a:rPr kumimoji="1" lang="en-US" altLang="zh-TW" dirty="0" err="1">
-                <a:latin typeface="Times New Roman" panose="02020603050405020304" pitchFamily="18" charset="0"/>
-                <a:cs typeface="Times New Roman" panose="02020603050405020304" pitchFamily="18" charset="0"/>
-              </a:rPr>
-              <a:t>sockfd</a:t>
-            </a:r>
-            <a:r>
-              <a:rPr kumimoji="1" lang="en-US" altLang="zh-TW" dirty="0">
-                <a:latin typeface="Times New Roman" panose="02020603050405020304" pitchFamily="18" charset="0"/>
-                <a:cs typeface="Times New Roman" panose="02020603050405020304" pitchFamily="18" charset="0"/>
-              </a:rPr>
-              <a:t> : socket descriptor</a:t>
-            </a:r>
-          </a:p>
-          <a:p>
-            <a:pPr lvl="1"/>
-            <a:r>
-              <a:rPr kumimoji="1" lang="en-US" altLang="zh-TW" dirty="0" err="1">
-                <a:latin typeface="Times New Roman" panose="02020603050405020304" pitchFamily="18" charset="0"/>
-                <a:cs typeface="Times New Roman" panose="02020603050405020304" pitchFamily="18" charset="0"/>
-              </a:rPr>
-              <a:t>server_addr</a:t>
-            </a:r>
-            <a:endParaRPr kumimoji="1" lang="en-US" altLang="zh-TW" dirty="0">
-              <a:latin typeface="Times New Roman" panose="02020603050405020304" pitchFamily="18" charset="0"/>
-              <a:cs typeface="Times New Roman" panose="02020603050405020304" pitchFamily="18" charset="0"/>
-            </a:endParaRPr>
-          </a:p>
-          <a:p>
-            <a:pPr lvl="1"/>
-            <a:r>
-              <a:rPr kumimoji="1" lang="en-US" altLang="zh-TW" dirty="0" err="1">
-                <a:latin typeface="Times New Roman" panose="02020603050405020304" pitchFamily="18" charset="0"/>
-                <a:cs typeface="Times New Roman" panose="02020603050405020304" pitchFamily="18" charset="0"/>
-              </a:rPr>
-              <a:t>server_addr</a:t>
-            </a:r>
-            <a:r>
-              <a:rPr kumimoji="1" lang="en-US" altLang="zh-TW" dirty="0">
-                <a:latin typeface="Times New Roman" panose="02020603050405020304" pitchFamily="18" charset="0"/>
-                <a:cs typeface="Times New Roman" panose="02020603050405020304" pitchFamily="18" charset="0"/>
-              </a:rPr>
-              <a:t> size</a:t>
-            </a:r>
-          </a:p>
-          <a:p>
-            <a:pPr marL="0" indent="0">
-              <a:buNone/>
-            </a:pPr>
-            <a:endParaRPr kumimoji="1" lang="en-US" altLang="zh-TW" dirty="0">
-              <a:latin typeface="Times New Roman" panose="02020603050405020304" pitchFamily="18" charset="0"/>
-              <a:cs typeface="Times New Roman" panose="02020603050405020304" pitchFamily="18" charset="0"/>
-            </a:endParaRPr>
-          </a:p>
-          <a:p>
-            <a:endParaRPr kumimoji="1" lang="en-US" altLang="zh-TW" dirty="0">
-              <a:latin typeface="Times New Roman" panose="02020603050405020304" pitchFamily="18" charset="0"/>
-              <a:cs typeface="Times New Roman" panose="02020603050405020304" pitchFamily="18" charset="0"/>
-            </a:endParaRPr>
-          </a:p>
-          <a:p>
-            <a:pPr lvl="1"/>
-            <a:endParaRPr kumimoji="1" lang="en-US" altLang="zh-TW" dirty="0">
-              <a:latin typeface="Times New Roman" panose="02020603050405020304" pitchFamily="18" charset="0"/>
-              <a:cs typeface="Times New Roman" panose="02020603050405020304" pitchFamily="18" charset="0"/>
-            </a:endParaRPr>
-          </a:p>
-        </p:txBody>
-      </p:sp>
-      <p:sp>
-        <p:nvSpPr>
-          <p:cNvPr id="4" name="矩形 3">
-            <a:extLst>
-              <a:ext uri="{FF2B5EF4-FFF2-40B4-BE49-F238E27FC236}">
-                <a16:creationId xmlns:a16="http://schemas.microsoft.com/office/drawing/2014/main" id="{BE54BB95-4C39-4A55-8564-0029E01AC52B}"/>
-              </a:ext>
-            </a:extLst>
-          </p:cNvPr>
-          <p:cNvSpPr/>
-          <p:nvPr/>
-        </p:nvSpPr>
-        <p:spPr>
-          <a:xfrm>
-            <a:off x="7155809" y="2567031"/>
-            <a:ext cx="3422708" cy="612397"/>
-          </a:xfrm>
-          <a:prstGeom prst="rect">
-            <a:avLst/>
-          </a:prstGeom>
-          <a:noFill/>
-          <a:ln w="38100">
-            <a:solidFill>
-              <a:srgbClr val="FF0000"/>
-            </a:solidFill>
-          </a:ln>
-        </p:spPr>
-        <p:style>
-          <a:lnRef idx="2">
-            <a:schemeClr val="accent1">
-              <a:shade val="50000"/>
-            </a:schemeClr>
-          </a:lnRef>
-          <a:fillRef idx="1">
-            <a:schemeClr val="accent1"/>
-          </a:fillRef>
-          <a:effectRef idx="0">
-            <a:schemeClr val="accent1"/>
-          </a:effectRef>
-          <a:fontRef idx="minor">
-            <a:schemeClr val="lt1"/>
-          </a:fontRef>
-        </p:style>
-        <p:txBody>
-          <a:bodyPr rtlCol="0" anchor="ctr"/>
-          <a:lstStyle/>
-          <a:p>
-            <a:pPr algn="ctr"/>
-            <a:endParaRPr lang="zh-TW" altLang="en-US">
-              <a:latin typeface="Times New Roman" panose="02020603050405020304" pitchFamily="18" charset="0"/>
-              <a:cs typeface="Times New Roman" panose="02020603050405020304" pitchFamily="18" charset="0"/>
-            </a:endParaRPr>
-          </a:p>
-        </p:txBody>
-      </p:sp>
-    </p:spTree>
-    <p:extLst>
-      <p:ext uri="{BB962C8B-B14F-4D97-AF65-F5344CB8AC3E}">
-        <p14:creationId xmlns:p14="http://schemas.microsoft.com/office/powerpoint/2010/main" val="1654331213"/>
       </p:ext>
     </p:extLst>
   </p:cSld>
@@ -14484,13 +15571,7 @@
       </p:grpSpPr>
       <p:sp>
         <p:nvSpPr>
-          <p:cNvPr id="2" name="標題 1">
-            <a:extLst>
-              <a:ext uri="{FF2B5EF4-FFF2-40B4-BE49-F238E27FC236}">
-                <a16:creationId xmlns:a16="http://schemas.microsoft.com/office/drawing/2014/main" id="{6A4B1DD1-3526-4377-B811-DCC2D44E9340}"/>
-              </a:ext>
-            </a:extLst>
-          </p:cNvPr>
+          <p:cNvPr id="2" name="標題 1"/>
           <p:cNvSpPr>
             <a:spLocks noGrp="1"/>
           </p:cNvSpPr>
@@ -14498,14 +15579,19 @@
             <p:ph type="title"/>
           </p:nvPr>
         </p:nvSpPr>
-        <p:spPr/>
+        <p:spPr>
+          <a:xfrm>
+            <a:off x="838200" y="365125"/>
+            <a:ext cx="10515600" cy="1325563"/>
+          </a:xfrm>
+        </p:spPr>
         <p:txBody>
           <a:bodyPr/>
           <a:lstStyle/>
           <a:p>
             <a:r>
               <a:rPr lang="en-US" altLang="zh-TW" dirty="0"/>
-              <a:t>Using System Call</a:t>
+              <a:t>Function introduction</a:t>
             </a:r>
             <a:endParaRPr lang="zh-TW" altLang="en-US" dirty="0"/>
           </a:p>
@@ -14513,236 +15599,169 @@
       </p:sp>
       <p:sp>
         <p:nvSpPr>
-          <p:cNvPr id="7" name="文字方塊 6">
-            <a:extLst>
-              <a:ext uri="{FF2B5EF4-FFF2-40B4-BE49-F238E27FC236}">
-                <a16:creationId xmlns:a16="http://schemas.microsoft.com/office/drawing/2014/main" id="{C035ECCC-9D48-4054-88F6-327E63B7AD13}"/>
-              </a:ext>
-            </a:extLst>
-          </p:cNvPr>
-          <p:cNvSpPr txBox="1"/>
-          <p:nvPr/>
+          <p:cNvPr id="3" name="內容版面配置區 2"/>
+          <p:cNvSpPr>
+            <a:spLocks noGrp="1"/>
+          </p:cNvSpPr>
+          <p:nvPr>
+            <p:ph idx="1"/>
+          </p:nvPr>
         </p:nvSpPr>
         <p:spPr>
           <a:xfrm>
-            <a:off x="1367405" y="1812022"/>
-            <a:ext cx="9278224" cy="3724096"/>
+            <a:off x="838200" y="1690688"/>
+            <a:ext cx="10515600" cy="4546833"/>
           </a:xfrm>
-          <a:prstGeom prst="rect">
-            <a:avLst/>
-          </a:prstGeom>
-          <a:noFill/>
         </p:spPr>
         <p:txBody>
-          <a:bodyPr wrap="square" rtlCol="0">
-            <a:spAutoFit/>
+          <a:bodyPr>
+            <a:normAutofit/>
           </a:bodyPr>
           <a:lstStyle/>
           <a:p>
-            <a:pPr marL="285750" indent="-285750">
-              <a:buFont typeface="Arial" panose="020B0604020202020204" pitchFamily="34" charset="0"/>
-              <a:buChar char="•"/>
+            <a:pPr marL="0" indent="0">
+              <a:buNone/>
             </a:pPr>
             <a:r>
-              <a:rPr lang="en-US" altLang="zh-TW" sz="2800" dirty="0">
+              <a:rPr lang="en-US" altLang="zh-TW" sz="2800" b="1" dirty="0"/>
+              <a:t>int s</a:t>
+            </a:r>
+            <a:r>
+              <a:rPr lang="zh-TW" altLang="zh-TW" sz="2800" b="1" dirty="0"/>
+              <a:t>ocket(int domain, int type, int protocol) </a:t>
+            </a:r>
+            <a:r>
+              <a:rPr lang="en-US" altLang="zh-TW" sz="2800" b="1" dirty="0"/>
+              <a:t>;</a:t>
+            </a:r>
+            <a:endParaRPr lang="zh-TW" altLang="zh-TW" sz="2800" b="1" dirty="0"/>
+          </a:p>
+          <a:p>
+            <a:endParaRPr lang="en-US" altLang="zh-TW" dirty="0"/>
+          </a:p>
+          <a:p>
+            <a:r>
+              <a:rPr lang="en-US" altLang="zh-TW" dirty="0"/>
+              <a:t>d</a:t>
+            </a:r>
+            <a:r>
+              <a:rPr lang="zh-TW" altLang="zh-TW" dirty="0"/>
+              <a:t>omain</a:t>
+            </a:r>
+            <a:r>
+              <a:rPr lang="en-US" altLang="zh-TW" dirty="0"/>
+              <a:t> : </a:t>
+            </a:r>
+            <a:r>
+              <a:rPr lang="zh-TW" altLang="zh-TW" dirty="0"/>
+              <a:t>Specifies the communications domain in which a socket is to be created.</a:t>
+            </a:r>
+            <a:endParaRPr lang="en-US" altLang="zh-TW" dirty="0"/>
+          </a:p>
+          <a:p>
+            <a:endParaRPr lang="zh-TW" altLang="zh-TW" dirty="0"/>
+          </a:p>
+          <a:p>
+            <a:r>
+              <a:rPr lang="en-US" altLang="zh-TW" dirty="0"/>
+              <a:t>t</a:t>
+            </a:r>
+            <a:r>
+              <a:rPr lang="zh-TW" altLang="zh-TW" dirty="0"/>
+              <a:t>ype</a:t>
+            </a:r>
+            <a:r>
+              <a:rPr lang="en-US" altLang="zh-TW" dirty="0"/>
+              <a:t>       : </a:t>
+            </a:r>
+            <a:r>
+              <a:rPr lang="zh-TW" altLang="zh-TW" dirty="0"/>
+              <a:t>Specifies the type of socket to be created.</a:t>
+            </a:r>
+            <a:endParaRPr lang="en-US" altLang="zh-TW" dirty="0"/>
+          </a:p>
+          <a:p>
+            <a:pPr lvl="1"/>
+            <a:r>
+              <a:rPr lang="en-US" altLang="zh-TW" dirty="0"/>
+              <a:t>SOCK_STREAM: for TCP</a:t>
+            </a:r>
+          </a:p>
+          <a:p>
+            <a:pPr lvl="1"/>
+            <a:r>
+              <a:rPr kumimoji="1" lang="en-US" altLang="zh-TW" dirty="0"/>
+              <a:t>SOCK_DGRAM:</a:t>
+            </a:r>
+            <a:r>
+              <a:rPr kumimoji="1" lang="zh-TW" altLang="en-US" dirty="0"/>
+              <a:t>  </a:t>
+            </a:r>
+            <a:r>
+              <a:rPr kumimoji="1" lang="en-US" altLang="zh-TW" dirty="0"/>
+              <a:t>for</a:t>
+            </a:r>
+            <a:r>
+              <a:rPr kumimoji="1" lang="zh-TW" altLang="en-US" dirty="0"/>
+              <a:t> </a:t>
+            </a:r>
+            <a:r>
+              <a:rPr kumimoji="1" lang="en-US" altLang="zh-TW" dirty="0"/>
+              <a:t>UDP</a:t>
+            </a:r>
+            <a:endParaRPr lang="zh-TW" altLang="zh-TW" dirty="0"/>
+          </a:p>
+          <a:p>
+            <a:r>
+              <a:rPr lang="en-US" altLang="zh-TW" dirty="0"/>
+              <a:t>p</a:t>
+            </a:r>
+            <a:r>
+              <a:rPr lang="zh-TW" altLang="zh-TW" dirty="0"/>
+              <a:t>rotocol</a:t>
+            </a:r>
+            <a:r>
+              <a:rPr lang="en-US" altLang="zh-TW" dirty="0"/>
+              <a:t> :</a:t>
+            </a:r>
+            <a:r>
+              <a:rPr lang="zh-TW" altLang="zh-TW" dirty="0"/>
+              <a:t>Specifies a particular protocol to be used with the socket.</a:t>
+            </a:r>
+          </a:p>
+          <a:p>
+            <a:pPr lvl="1"/>
+            <a:endParaRPr lang="zh-TW" altLang="zh-TW" dirty="0"/>
+          </a:p>
+          <a:p>
+            <a:r>
+              <a:rPr lang="en-US" altLang="zh-TW" dirty="0"/>
+              <a:t>return value: n</a:t>
+            </a:r>
+            <a:r>
+              <a:rPr lang="en-US" altLang="zh-TW" b="0" i="0" dirty="0">
+                <a:solidFill>
+                  <a:srgbClr val="000000"/>
+                </a:solidFill>
+                <a:effectLst/>
                 <a:latin typeface="Times New Roman" panose="02020603050405020304" pitchFamily="18" charset="0"/>
-                <a:cs typeface="Times New Roman" panose="02020603050405020304" pitchFamily="18" charset="0"/>
               </a:rPr>
-              <a:t>listen(int </a:t>
-            </a:r>
-            <a:r>
-              <a:rPr lang="en-US" altLang="zh-TW" sz="2800" dirty="0" err="1">
-                <a:latin typeface="Times New Roman" panose="02020603050405020304" pitchFamily="18" charset="0"/>
-                <a:cs typeface="Times New Roman" panose="02020603050405020304" pitchFamily="18" charset="0"/>
-              </a:rPr>
-              <a:t>sockfd</a:t>
-            </a:r>
-            <a:r>
-              <a:rPr lang="en-US" altLang="zh-TW" sz="2800" dirty="0">
-                <a:latin typeface="Times New Roman" panose="02020603050405020304" pitchFamily="18" charset="0"/>
-                <a:cs typeface="Times New Roman" panose="02020603050405020304" pitchFamily="18" charset="0"/>
-              </a:rPr>
-              <a:t>, int backlog);</a:t>
-            </a:r>
-          </a:p>
-          <a:p>
-            <a:pPr marL="285750" indent="-285750">
-              <a:buFont typeface="Arial" panose="020B0604020202020204" pitchFamily="34" charset="0"/>
-              <a:buChar char="•"/>
-            </a:pPr>
-            <a:endParaRPr lang="en-US" altLang="zh-TW" sz="2400" dirty="0">
-              <a:latin typeface="Times New Roman" panose="02020603050405020304" pitchFamily="18" charset="0"/>
-              <a:cs typeface="Times New Roman" panose="02020603050405020304" pitchFamily="18" charset="0"/>
-            </a:endParaRPr>
-          </a:p>
-          <a:p>
-            <a:pPr marL="742950" lvl="1" indent="-285750">
-              <a:buFont typeface="Arial" panose="020B0604020202020204" pitchFamily="34" charset="0"/>
-              <a:buChar char="•"/>
-            </a:pPr>
-            <a:r>
-              <a:rPr lang="en-US" altLang="zh-TW" sz="2400" dirty="0">
-                <a:latin typeface="Times New Roman" panose="02020603050405020304" pitchFamily="18" charset="0"/>
-                <a:cs typeface="Times New Roman" panose="02020603050405020304" pitchFamily="18" charset="0"/>
-              </a:rPr>
-              <a:t>backlog : how many client can access the server</a:t>
-            </a:r>
-          </a:p>
-          <a:p>
-            <a:pPr marL="742950" lvl="1" indent="-285750">
-              <a:buFont typeface="Arial" panose="020B0604020202020204" pitchFamily="34" charset="0"/>
-              <a:buChar char="•"/>
-            </a:pPr>
-            <a:endParaRPr lang="en-US" altLang="zh-TW" sz="2400" dirty="0">
-              <a:latin typeface="Times New Roman" panose="02020603050405020304" pitchFamily="18" charset="0"/>
-              <a:cs typeface="Times New Roman" panose="02020603050405020304" pitchFamily="18" charset="0"/>
-            </a:endParaRPr>
-          </a:p>
-          <a:p>
-            <a:pPr marL="285750" indent="-285750">
-              <a:buFont typeface="Arial" panose="020B0604020202020204" pitchFamily="34" charset="0"/>
-              <a:buChar char="•"/>
-            </a:pPr>
-            <a:r>
-              <a:rPr lang="en-US" altLang="zh-TW" sz="2800" dirty="0">
-                <a:latin typeface="Times New Roman" panose="02020603050405020304" pitchFamily="18" charset="0"/>
-                <a:cs typeface="Times New Roman" panose="02020603050405020304" pitchFamily="18" charset="0"/>
-              </a:rPr>
-              <a:t>accept (int </a:t>
-            </a:r>
-            <a:r>
-              <a:rPr lang="en-US" altLang="zh-TW" sz="2800" dirty="0" err="1">
-                <a:latin typeface="Times New Roman" panose="02020603050405020304" pitchFamily="18" charset="0"/>
-                <a:cs typeface="Times New Roman" panose="02020603050405020304" pitchFamily="18" charset="0"/>
-              </a:rPr>
-              <a:t>sockfd</a:t>
-            </a:r>
-            <a:r>
-              <a:rPr lang="en-US" altLang="zh-TW" sz="2800" dirty="0">
-                <a:latin typeface="Times New Roman" panose="02020603050405020304" pitchFamily="18" charset="0"/>
-                <a:cs typeface="Times New Roman" panose="02020603050405020304" pitchFamily="18" charset="0"/>
-              </a:rPr>
-              <a:t>, struct </a:t>
-            </a:r>
-            <a:r>
-              <a:rPr lang="en-US" altLang="zh-TW" sz="2800" dirty="0" err="1">
-                <a:latin typeface="Times New Roman" panose="02020603050405020304" pitchFamily="18" charset="0"/>
-                <a:cs typeface="Times New Roman" panose="02020603050405020304" pitchFamily="18" charset="0"/>
-              </a:rPr>
-              <a:t>sockaddr</a:t>
-            </a:r>
-            <a:r>
-              <a:rPr lang="en-US" altLang="zh-TW" sz="2800" dirty="0">
-                <a:latin typeface="Times New Roman" panose="02020603050405020304" pitchFamily="18" charset="0"/>
-                <a:cs typeface="Times New Roman" panose="02020603050405020304" pitchFamily="18" charset="0"/>
-              </a:rPr>
-              <a:t> </a:t>
-            </a:r>
-            <a:r>
-              <a:rPr lang="en-US" altLang="zh-TW" sz="2800" dirty="0" err="1">
-                <a:latin typeface="Times New Roman" panose="02020603050405020304" pitchFamily="18" charset="0"/>
-                <a:cs typeface="Times New Roman" panose="02020603050405020304" pitchFamily="18" charset="0"/>
-              </a:rPr>
-              <a:t>addr</a:t>
-            </a:r>
-            <a:r>
-              <a:rPr lang="en-US" altLang="zh-TW" sz="2800" dirty="0">
-                <a:latin typeface="Times New Roman" panose="02020603050405020304" pitchFamily="18" charset="0"/>
-                <a:cs typeface="Times New Roman" panose="02020603050405020304" pitchFamily="18" charset="0"/>
-              </a:rPr>
-              <a:t>, </a:t>
-            </a:r>
-            <a:r>
-              <a:rPr lang="en-US" altLang="zh-TW" sz="2800" dirty="0" err="1">
-                <a:latin typeface="Times New Roman" panose="02020603050405020304" pitchFamily="18" charset="0"/>
-                <a:cs typeface="Times New Roman" panose="02020603050405020304" pitchFamily="18" charset="0"/>
-              </a:rPr>
-              <a:t>socklen_t</a:t>
-            </a:r>
-            <a:r>
-              <a:rPr lang="en-US" altLang="zh-TW" sz="2800" dirty="0">
-                <a:latin typeface="Times New Roman" panose="02020603050405020304" pitchFamily="18" charset="0"/>
-                <a:cs typeface="Times New Roman" panose="02020603050405020304" pitchFamily="18" charset="0"/>
-              </a:rPr>
-              <a:t> </a:t>
-            </a:r>
-            <a:r>
-              <a:rPr lang="en-US" altLang="zh-TW" sz="2800" dirty="0" err="1">
-                <a:latin typeface="Times New Roman" panose="02020603050405020304" pitchFamily="18" charset="0"/>
-                <a:cs typeface="Times New Roman" panose="02020603050405020304" pitchFamily="18" charset="0"/>
-              </a:rPr>
-              <a:t>addrlen</a:t>
-            </a:r>
-            <a:r>
-              <a:rPr lang="en-US" altLang="zh-TW" sz="2800" dirty="0">
-                <a:latin typeface="Times New Roman" panose="02020603050405020304" pitchFamily="18" charset="0"/>
-                <a:cs typeface="Times New Roman" panose="02020603050405020304" pitchFamily="18" charset="0"/>
-              </a:rPr>
-              <a:t>);</a:t>
-            </a:r>
-          </a:p>
-          <a:p>
-            <a:pPr marL="285750" indent="-285750">
-              <a:buFont typeface="Arial" panose="020B0604020202020204" pitchFamily="34" charset="0"/>
-              <a:buChar char="•"/>
-            </a:pPr>
-            <a:endParaRPr lang="en-US" altLang="zh-TW" sz="2400" dirty="0">
-              <a:latin typeface="Times New Roman" panose="02020603050405020304" pitchFamily="18" charset="0"/>
-              <a:cs typeface="Times New Roman" panose="02020603050405020304" pitchFamily="18" charset="0"/>
-            </a:endParaRPr>
-          </a:p>
-          <a:p>
-            <a:pPr marL="742950" lvl="1" indent="-285750">
-              <a:buFont typeface="Arial" panose="020B0604020202020204" pitchFamily="34" charset="0"/>
-              <a:buChar char="•"/>
-            </a:pPr>
-            <a:r>
-              <a:rPr lang="en-US" altLang="zh-TW" sz="2400" dirty="0">
-                <a:latin typeface="Times New Roman" panose="02020603050405020304" pitchFamily="18" charset="0"/>
-                <a:cs typeface="Times New Roman" panose="02020603050405020304" pitchFamily="18" charset="0"/>
-              </a:rPr>
-              <a:t>Accept the access for the client connection</a:t>
-            </a:r>
-          </a:p>
-          <a:p>
-            <a:pPr marL="742950" lvl="1" indent="-285750">
-              <a:buFont typeface="Arial" panose="020B0604020202020204" pitchFamily="34" charset="0"/>
-              <a:buChar char="•"/>
-            </a:pPr>
-            <a:r>
-              <a:rPr lang="en-US" altLang="zh-TW" sz="2400" dirty="0">
-                <a:latin typeface="Times New Roman" panose="02020603050405020304" pitchFamily="18" charset="0"/>
-                <a:cs typeface="Times New Roman" panose="02020603050405020304" pitchFamily="18" charset="0"/>
-              </a:rPr>
-              <a:t>The </a:t>
-            </a:r>
-            <a:r>
-              <a:rPr lang="en-US" altLang="zh-TW" sz="2400" dirty="0" err="1">
-                <a:latin typeface="Times New Roman" panose="02020603050405020304" pitchFamily="18" charset="0"/>
-                <a:cs typeface="Times New Roman" panose="02020603050405020304" pitchFamily="18" charset="0"/>
-              </a:rPr>
-              <a:t>addr</a:t>
-            </a:r>
-            <a:r>
-              <a:rPr lang="en-US" altLang="zh-TW" sz="2400" dirty="0">
-                <a:latin typeface="Times New Roman" panose="02020603050405020304" pitchFamily="18" charset="0"/>
-                <a:cs typeface="Times New Roman" panose="02020603050405020304" pitchFamily="18" charset="0"/>
-              </a:rPr>
-              <a:t> will record the client address</a:t>
-            </a:r>
-          </a:p>
-          <a:p>
-            <a:pPr marL="742950" lvl="1" indent="-285750">
-              <a:buFont typeface="Arial" panose="020B0604020202020204" pitchFamily="34" charset="0"/>
-              <a:buChar char="•"/>
-            </a:pPr>
+              <a:t>onnegative integer, the socket file descriptor.</a:t>
+            </a:r>
             <a:endParaRPr lang="en-US" altLang="zh-TW" dirty="0"/>
           </a:p>
           <a:p>
-            <a:pPr marL="285750" indent="-285750">
-              <a:buFont typeface="Arial" panose="020B0604020202020204" pitchFamily="34" charset="0"/>
-              <a:buChar char="•"/>
-            </a:pPr>
+            <a:pPr lvl="1"/>
+            <a:endParaRPr lang="en-US" altLang="zh-TW" dirty="0"/>
+          </a:p>
+          <a:p>
+            <a:endParaRPr lang="en-US" altLang="zh-TW" dirty="0"/>
+          </a:p>
+          <a:p>
+            <a:endParaRPr lang="en-US" altLang="zh-TW" dirty="0"/>
+          </a:p>
+          <a:p>
+            <a:pPr lvl="1"/>
             <a:endParaRPr lang="en-US" altLang="zh-TW" dirty="0"/>
           </a:p>
         </p:txBody>
@@ -14750,7 +15769,7 @@
     </p:spTree>
     <p:extLst>
       <p:ext uri="{BB962C8B-B14F-4D97-AF65-F5344CB8AC3E}">
-        <p14:creationId xmlns:p14="http://schemas.microsoft.com/office/powerpoint/2010/main" val="2886997713"/>
+        <p14:creationId xmlns:p14="http://schemas.microsoft.com/office/powerpoint/2010/main" val="1654331213"/>
       </p:ext>
     </p:extLst>
   </p:cSld>
@@ -14787,16 +15806,21 @@
             <p:ph type="title"/>
           </p:nvPr>
         </p:nvSpPr>
-        <p:spPr/>
+        <p:spPr>
+          <a:xfrm>
+            <a:off x="838200" y="365125"/>
+            <a:ext cx="10515600" cy="1325563"/>
+          </a:xfrm>
+        </p:spPr>
         <p:txBody>
           <a:bodyPr/>
           <a:lstStyle/>
           <a:p>
             <a:r>
-              <a:rPr kumimoji="1" lang="en-US" altLang="zh-TW" dirty="0"/>
-              <a:t>UDP</a:t>
-            </a:r>
-            <a:endParaRPr kumimoji="1" lang="zh-TW" altLang="en-US" dirty="0"/>
+              <a:rPr lang="en-US" altLang="zh-TW" dirty="0"/>
+              <a:t>Function introduction (Server)</a:t>
+            </a:r>
+            <a:endParaRPr lang="zh-TW" altLang="en-US" dirty="0"/>
           </a:p>
         </p:txBody>
       </p:sp>
@@ -14810,91 +15834,190 @@
             <p:ph idx="1"/>
           </p:nvPr>
         </p:nvSpPr>
-        <p:spPr/>
+        <p:spPr>
+          <a:xfrm>
+            <a:off x="838200" y="1690688"/>
+            <a:ext cx="10515600" cy="5012116"/>
+          </a:xfrm>
+        </p:spPr>
         <p:txBody>
-          <a:bodyPr/>
+          <a:bodyPr>
+            <a:normAutofit/>
+          </a:bodyPr>
           <a:lstStyle/>
           <a:p>
-            <a:r>
-              <a:rPr kumimoji="1" lang="en-US" altLang="zh-TW" dirty="0">
+            <a:pPr marL="0" indent="0">
+              <a:buNone/>
+            </a:pPr>
+            <a:r>
+              <a:rPr lang="en-US" altLang="zh-TW" sz="2600" b="1" dirty="0"/>
+              <a:t>int bind(int socket, const struct </a:t>
+            </a:r>
+            <a:r>
+              <a:rPr lang="en-US" altLang="zh-TW" sz="2600" b="1" dirty="0" err="1"/>
+              <a:t>sockaddr</a:t>
+            </a:r>
+            <a:r>
+              <a:rPr lang="en-US" altLang="zh-TW" sz="2600" b="1" dirty="0"/>
+              <a:t> *address, </a:t>
+            </a:r>
+            <a:r>
+              <a:rPr lang="en-US" altLang="zh-TW" sz="2600" b="1" dirty="0" err="1"/>
+              <a:t>socklen_t</a:t>
+            </a:r>
+            <a:r>
+              <a:rPr lang="en-US" altLang="zh-TW" sz="2600" b="1" dirty="0"/>
+              <a:t> </a:t>
+            </a:r>
+            <a:r>
+              <a:rPr lang="en-US" altLang="zh-TW" sz="2600" b="1" dirty="0" err="1"/>
+              <a:t>address_len</a:t>
+            </a:r>
+            <a:r>
+              <a:rPr lang="en-US" altLang="zh-TW" sz="2600" b="1" dirty="0"/>
+              <a:t>);</a:t>
+            </a:r>
+          </a:p>
+          <a:p>
+            <a:pPr lvl="1"/>
+            <a:r>
+              <a:rPr lang="en-US" altLang="zh-TW" dirty="0"/>
+              <a:t>The bind() function assigns an address to an unnamed socket.</a:t>
+            </a:r>
+          </a:p>
+          <a:p>
+            <a:pPr lvl="1"/>
+            <a:endParaRPr lang="en-US" altLang="zh-TW" dirty="0"/>
+          </a:p>
+          <a:p>
+            <a:r>
+              <a:rPr lang="en-US" altLang="zh-TW" dirty="0"/>
+              <a:t>socket : Specifies the file descriptor of the socket to be bound</a:t>
+            </a:r>
+            <a:r>
+              <a:rPr lang="zh-TW" altLang="zh-TW" dirty="0"/>
+              <a:t>.</a:t>
+            </a:r>
+            <a:endParaRPr lang="en-US" altLang="zh-TW" dirty="0"/>
+          </a:p>
+          <a:p>
+            <a:pPr marL="457200" lvl="1" indent="0">
+              <a:buNone/>
+            </a:pPr>
+            <a:r>
+              <a:rPr lang="en-US" altLang="zh-TW" dirty="0"/>
+              <a:t># Give it the </a:t>
+            </a:r>
+            <a:r>
+              <a:rPr lang="en-US" altLang="zh-TW" b="1" dirty="0"/>
+              <a:t>return value </a:t>
+            </a:r>
+            <a:r>
+              <a:rPr lang="en-US" altLang="zh-TW" dirty="0"/>
+              <a:t>of </a:t>
+            </a:r>
+            <a:r>
+              <a:rPr lang="en-US" altLang="zh-TW" b="1" dirty="0"/>
+              <a:t>socket()</a:t>
+            </a:r>
+          </a:p>
+          <a:p>
+            <a:pPr marL="457200" lvl="1" indent="0">
+              <a:buNone/>
+            </a:pPr>
+            <a:endParaRPr lang="zh-TW" altLang="zh-TW" b="1" dirty="0"/>
+          </a:p>
+          <a:p>
+            <a:r>
+              <a:rPr lang="en-US" altLang="zh-TW" dirty="0"/>
+              <a:t>address: </a:t>
+            </a:r>
+            <a:r>
+              <a:rPr lang="en-US" altLang="zh-TW" sz="2200" dirty="0"/>
+              <a:t>Points to a </a:t>
+            </a:r>
+            <a:r>
+              <a:rPr lang="en-US" altLang="zh-TW" sz="2200" dirty="0" err="1"/>
+              <a:t>sockaddr</a:t>
+            </a:r>
+            <a:r>
+              <a:rPr lang="en-US" altLang="zh-TW" sz="2200" dirty="0"/>
+              <a:t> structure containing the address to be bound to the socket.</a:t>
+            </a:r>
+          </a:p>
+          <a:p>
+            <a:endParaRPr lang="en-US" altLang="zh-TW" sz="2200" dirty="0"/>
+          </a:p>
+          <a:p>
+            <a:r>
+              <a:rPr lang="en-US" altLang="zh-TW" dirty="0" err="1"/>
+              <a:t>address_len</a:t>
+            </a:r>
+            <a:r>
+              <a:rPr lang="en-US" altLang="zh-TW" dirty="0"/>
+              <a:t>:</a:t>
+            </a:r>
+          </a:p>
+          <a:p>
+            <a:pPr marL="457200" lvl="1" indent="0">
+              <a:buNone/>
+            </a:pPr>
+            <a:r>
+              <a:rPr lang="en-US" altLang="zh-TW" dirty="0"/>
+              <a:t>Specifies the length of the </a:t>
+            </a:r>
+            <a:r>
+              <a:rPr lang="en-US" altLang="zh-TW" dirty="0" err="1"/>
+              <a:t>sockaddr</a:t>
+            </a:r>
+            <a:r>
+              <a:rPr lang="en-US" altLang="zh-TW" dirty="0"/>
+              <a:t> structure pointed to by the address argument.</a:t>
+            </a:r>
+          </a:p>
+          <a:p>
+            <a:pPr marL="457200" lvl="1" indent="0">
+              <a:buNone/>
+            </a:pPr>
+            <a:endParaRPr lang="zh-TW" altLang="zh-TW" dirty="0"/>
+          </a:p>
+          <a:p>
+            <a:r>
+              <a:rPr lang="en-US" altLang="zh-TW" dirty="0"/>
+              <a:t>return value: successful return 0, otherwise return -1</a:t>
+            </a:r>
+            <a:r>
+              <a:rPr lang="en-US" altLang="zh-TW" b="0" i="0" dirty="0">
+                <a:solidFill>
+                  <a:srgbClr val="000000"/>
+                </a:solidFill>
+                <a:effectLst/>
                 <a:latin typeface="Times New Roman" panose="02020603050405020304" pitchFamily="18" charset="0"/>
-                <a:cs typeface="Times New Roman" panose="02020603050405020304" pitchFamily="18" charset="0"/>
               </a:rPr>
-              <a:t>User Datagram Protocol</a:t>
-            </a:r>
-          </a:p>
-          <a:p>
-            <a:r>
-              <a:rPr kumimoji="1" lang="en-US" altLang="zh-TW" dirty="0">
-                <a:latin typeface="Times New Roman" panose="02020603050405020304" pitchFamily="18" charset="0"/>
-                <a:cs typeface="Times New Roman" panose="02020603050405020304" pitchFamily="18" charset="0"/>
-              </a:rPr>
-              <a:t>Unreliable</a:t>
-            </a:r>
-            <a:r>
-              <a:rPr kumimoji="1" lang="zh-TW" altLang="en-US" dirty="0">
-                <a:latin typeface="Times New Roman" panose="02020603050405020304" pitchFamily="18" charset="0"/>
-                <a:cs typeface="Times New Roman" panose="02020603050405020304" pitchFamily="18" charset="0"/>
-              </a:rPr>
-              <a:t> </a:t>
-            </a:r>
-            <a:r>
-              <a:rPr kumimoji="1" lang="en-US" altLang="zh-TW" dirty="0">
-                <a:latin typeface="Times New Roman" panose="02020603050405020304" pitchFamily="18" charset="0"/>
-                <a:cs typeface="Times New Roman" panose="02020603050405020304" pitchFamily="18" charset="0"/>
-              </a:rPr>
-              <a:t>and</a:t>
-            </a:r>
-            <a:r>
-              <a:rPr kumimoji="1" lang="zh-TW" altLang="en-US" dirty="0">
-                <a:latin typeface="Times New Roman" panose="02020603050405020304" pitchFamily="18" charset="0"/>
-                <a:cs typeface="Times New Roman" panose="02020603050405020304" pitchFamily="18" charset="0"/>
-              </a:rPr>
-              <a:t> </a:t>
-            </a:r>
-            <a:r>
-              <a:rPr kumimoji="1" lang="en-US" altLang="zh-TW" dirty="0">
-                <a:latin typeface="Times New Roman" panose="02020603050405020304" pitchFamily="18" charset="0"/>
-                <a:cs typeface="Times New Roman" panose="02020603050405020304" pitchFamily="18" charset="0"/>
-              </a:rPr>
-              <a:t>more</a:t>
-            </a:r>
-            <a:r>
-              <a:rPr kumimoji="1" lang="zh-TW" altLang="en-US" dirty="0">
-                <a:latin typeface="Times New Roman" panose="02020603050405020304" pitchFamily="18" charset="0"/>
-                <a:cs typeface="Times New Roman" panose="02020603050405020304" pitchFamily="18" charset="0"/>
-              </a:rPr>
-              <a:t> </a:t>
-            </a:r>
-            <a:r>
-              <a:rPr kumimoji="1" lang="en-US" altLang="zh-TW" dirty="0">
-                <a:latin typeface="Times New Roman" panose="02020603050405020304" pitchFamily="18" charset="0"/>
-                <a:cs typeface="Times New Roman" panose="02020603050405020304" pitchFamily="18" charset="0"/>
-              </a:rPr>
-              <a:t>fast</a:t>
-            </a:r>
-          </a:p>
-          <a:p>
-            <a:r>
-              <a:rPr lang="en-US" dirty="0">
-                <a:latin typeface="Times New Roman" panose="02020603050405020304" pitchFamily="18" charset="0"/>
-                <a:cs typeface="Times New Roman" panose="02020603050405020304" pitchFamily="18" charset="0"/>
-              </a:rPr>
-              <a:t>no guarantee of transferring data bits or packets in an arranged manner</a:t>
-            </a:r>
-          </a:p>
-          <a:p>
-            <a:endParaRPr kumimoji="1" lang="zh-TW" altLang="en-US" dirty="0">
-              <a:latin typeface="Times New Roman" panose="02020603050405020304" pitchFamily="18" charset="0"/>
-              <a:cs typeface="Times New Roman" panose="02020603050405020304" pitchFamily="18" charset="0"/>
-            </a:endParaRPr>
+              <a:t>.</a:t>
+            </a:r>
+            <a:endParaRPr lang="en-US" altLang="zh-TW" dirty="0"/>
+          </a:p>
+          <a:p>
+            <a:pPr lvl="1"/>
+            <a:endParaRPr lang="en-US" altLang="zh-TW" dirty="0"/>
+          </a:p>
+          <a:p>
+            <a:endParaRPr lang="en-US" altLang="zh-TW" dirty="0"/>
+          </a:p>
+          <a:p>
+            <a:endParaRPr lang="en-US" altLang="zh-TW" dirty="0"/>
+          </a:p>
+          <a:p>
+            <a:pPr lvl="1"/>
+            <a:endParaRPr lang="en-US" altLang="zh-TW" dirty="0"/>
           </a:p>
         </p:txBody>
       </p:sp>
     </p:spTree>
     <p:extLst>
       <p:ext uri="{BB962C8B-B14F-4D97-AF65-F5344CB8AC3E}">
-        <p14:creationId xmlns:p14="http://schemas.microsoft.com/office/powerpoint/2010/main" val="3789497580"/>
+        <p14:creationId xmlns:p14="http://schemas.microsoft.com/office/powerpoint/2010/main" val="1049866960"/>
       </p:ext>
     </p:extLst>
   </p:cSld>
@@ -14931,22 +16054,19 @@
             <p:ph type="title"/>
           </p:nvPr>
         </p:nvSpPr>
-        <p:spPr/>
+        <p:spPr>
+          <a:xfrm>
+            <a:off x="838200" y="365125"/>
+            <a:ext cx="10515600" cy="1325563"/>
+          </a:xfrm>
+        </p:spPr>
         <p:txBody>
           <a:bodyPr/>
           <a:lstStyle/>
           <a:p>
             <a:r>
               <a:rPr lang="en-US" altLang="zh-TW" dirty="0"/>
-              <a:t>UDP</a:t>
-            </a:r>
-            <a:r>
-              <a:rPr lang="zh-TW" altLang="en-US" dirty="0"/>
-              <a:t> </a:t>
-            </a:r>
-            <a:r>
-              <a:rPr lang="en-US" altLang="zh-TW" dirty="0"/>
-              <a:t>Flow (connectionless)</a:t>
+              <a:t>Function introduction (Server)</a:t>
             </a:r>
             <a:endParaRPr lang="zh-TW" altLang="en-US" dirty="0"/>
           </a:p>
@@ -14962,60 +16082,126 @@
             <p:ph idx="1"/>
           </p:nvPr>
         </p:nvSpPr>
-        <p:spPr/>
+        <p:spPr>
+          <a:xfrm>
+            <a:off x="838200" y="1690688"/>
+            <a:ext cx="10515600" cy="4546833"/>
+          </a:xfrm>
+        </p:spPr>
         <p:txBody>
-          <a:bodyPr/>
+          <a:bodyPr>
+            <a:normAutofit/>
+          </a:bodyPr>
           <a:lstStyle/>
           <a:p>
-            <a:endParaRPr lang="zh-TW" altLang="en-US" dirty="0"/>
+            <a:pPr marL="0" indent="0">
+              <a:buNone/>
+            </a:pPr>
+            <a:r>
+              <a:rPr lang="sv-SE" altLang="zh-TW" sz="2600" b="1" dirty="0"/>
+              <a:t>int listen(int socket, int backlog);</a:t>
+            </a:r>
+            <a:endParaRPr lang="en-US" altLang="zh-TW" sz="2600" dirty="0"/>
+          </a:p>
+          <a:p>
+            <a:r>
+              <a:rPr lang="en-US" altLang="zh-TW" dirty="0"/>
+              <a:t>socket : Specifies the file descriptor of the socket to be bound</a:t>
+            </a:r>
+            <a:r>
+              <a:rPr lang="zh-TW" altLang="zh-TW" dirty="0"/>
+              <a:t>.</a:t>
+            </a:r>
+            <a:endParaRPr lang="en-US" altLang="zh-TW" dirty="0"/>
+          </a:p>
+          <a:p>
+            <a:pPr marL="457200" lvl="1" indent="0">
+              <a:buNone/>
+            </a:pPr>
+            <a:r>
+              <a:rPr lang="en-US" altLang="zh-TW" dirty="0"/>
+              <a:t># Assign the </a:t>
+            </a:r>
+            <a:r>
+              <a:rPr lang="en-US" altLang="zh-TW" b="1" dirty="0"/>
+              <a:t>return value </a:t>
+            </a:r>
+            <a:r>
+              <a:rPr lang="en-US" altLang="zh-TW" dirty="0"/>
+              <a:t>of </a:t>
+            </a:r>
+            <a:r>
+              <a:rPr lang="en-US" altLang="zh-TW" b="1" dirty="0"/>
+              <a:t>socket() </a:t>
+            </a:r>
+            <a:r>
+              <a:rPr lang="en-US" altLang="zh-TW" dirty="0"/>
+              <a:t>to it</a:t>
+            </a:r>
+          </a:p>
+          <a:p>
+            <a:pPr marL="457200" lvl="1" indent="0">
+              <a:buNone/>
+            </a:pPr>
+            <a:endParaRPr lang="zh-TW" altLang="zh-TW" b="1" dirty="0"/>
+          </a:p>
+          <a:p>
+            <a:r>
+              <a:rPr lang="en-US" altLang="zh-TW" dirty="0"/>
+              <a:t>The listen() function marks a connection-mode socket, specified by the socket argument, as accepting connections, and limits the number of outstanding connections in the socket's listen queue to the value specified by the </a:t>
+            </a:r>
+            <a:r>
+              <a:rPr lang="en-US" altLang="zh-TW" b="1" dirty="0"/>
+              <a:t>backlog</a:t>
+            </a:r>
+            <a:r>
+              <a:rPr lang="en-US" altLang="zh-TW" dirty="0"/>
+              <a:t> argument.</a:t>
+            </a:r>
+          </a:p>
+          <a:p>
+            <a:pPr marL="457200" lvl="1" indent="0">
+              <a:buNone/>
+            </a:pPr>
+            <a:endParaRPr lang="zh-TW" altLang="zh-TW" dirty="0"/>
+          </a:p>
+          <a:p>
+            <a:r>
+              <a:rPr lang="en-US" altLang="zh-TW" dirty="0"/>
+              <a:t>return value: successful return 0, otherwise return -1</a:t>
+            </a:r>
+            <a:r>
+              <a:rPr lang="en-US" altLang="zh-TW" b="0" i="0" dirty="0">
+                <a:solidFill>
+                  <a:srgbClr val="000000"/>
+                </a:solidFill>
+                <a:effectLst/>
+                <a:latin typeface="Times New Roman" panose="02020603050405020304" pitchFamily="18" charset="0"/>
+              </a:rPr>
+              <a:t>.</a:t>
+            </a:r>
+            <a:endParaRPr lang="en-US" altLang="zh-TW" dirty="0"/>
+          </a:p>
+          <a:p>
+            <a:pPr lvl="1"/>
+            <a:endParaRPr lang="en-US" altLang="zh-TW" dirty="0"/>
+          </a:p>
+          <a:p>
+            <a:endParaRPr lang="en-US" altLang="zh-TW" dirty="0"/>
+          </a:p>
+          <a:p>
+            <a:endParaRPr lang="en-US" altLang="zh-TW" dirty="0"/>
+          </a:p>
+          <a:p>
+            <a:pPr lvl="1"/>
+            <a:endParaRPr lang="en-US" altLang="zh-TW" dirty="0"/>
           </a:p>
         </p:txBody>
       </p:sp>
-      <p:pic>
-        <p:nvPicPr>
-          <p:cNvPr id="2050" name="Picture 2" descr="http://pic.pimg.tw/kezeodsnx/4a83b8bcbf9da.png"/>
-          <p:cNvPicPr>
-            <a:picLocks noChangeAspect="1" noChangeArrowheads="1"/>
-          </p:cNvPicPr>
-          <p:nvPr/>
-        </p:nvPicPr>
-        <p:blipFill>
-          <a:blip r:embed="rId2">
-            <a:extLst>
-              <a:ext uri="{28A0092B-C50C-407E-A947-70E740481C1C}">
-                <a14:useLocalDpi xmlns:a14="http://schemas.microsoft.com/office/drawing/2010/main" val="0"/>
-              </a:ext>
-            </a:extLst>
-          </a:blip>
-          <a:srcRect/>
-          <a:stretch>
-            <a:fillRect/>
-          </a:stretch>
-        </p:blipFill>
-        <p:spPr bwMode="auto">
-          <a:xfrm>
-            <a:off x="3453136" y="1689729"/>
-            <a:ext cx="5285727" cy="4623130"/>
-          </a:xfrm>
-          <a:prstGeom prst="rect">
-            <a:avLst/>
-          </a:prstGeom>
-          <a:noFill/>
-          <a:extLst>
-            <a:ext uri="{909E8E84-426E-40dd-AFC4-6F175D3DCCD1}">
-              <a14:hiddenFill xmlns="" xmlns:a14="http://schemas.microsoft.com/office/drawing/2010/main">
-                <a:solidFill>
-                  <a:srgbClr val="FFFFFF"/>
-                </a:solidFill>
-              </a14:hiddenFill>
-            </a:ext>
-          </a:extLst>
-        </p:spPr>
-      </p:pic>
     </p:spTree>
     <p:extLst>
       <p:ext uri="{BB962C8B-B14F-4D97-AF65-F5344CB8AC3E}">
-        <p14:creationId xmlns:p14="http://schemas.microsoft.com/office/powerpoint/2010/main" val="853172571"/>
+        <p14:creationId xmlns:p14="http://schemas.microsoft.com/office/powerpoint/2010/main" val="3061626471"/>
       </p:ext>
     </p:extLst>
   </p:cSld>

</xml_diff>